<commit_message>
added unfinished markdown version of text
</commit_message>
<xml_diff>
--- a/tutkimusseminaari_rs_pp.pptx
+++ b/tutkimusseminaari_rs_pp.pptx
@@ -17,7 +17,7 @@
     <p:sldId id="268" r:id="rId11"/>
   </p:sldIdLst>
   <p:sldSz cx="12192000" cy="6858000"/>
-  <p:notesSz cx="6858000" cy="9144000"/>
+  <p:notesSz cx="7104063" cy="10234613"/>
   <p:defaultTextStyle>
     <a:defPPr>
       <a:defRPr lang="fi-FI"/>
@@ -270,7 +270,7 @@
           <a:p>
             <a:fld id="{4B690704-11ED-4B08-A18A-938335E0FAFD}" type="datetimeFigureOut">
               <a:rPr lang="fi-FI" smtClean="0"/>
-              <a:t>18.11.2023</a:t>
+              <a:t>28.11.2023</a:t>
             </a:fld>
             <a:endParaRPr lang="fi-FI"/>
           </a:p>
@@ -470,7 +470,7 @@
           <a:p>
             <a:fld id="{4B690704-11ED-4B08-A18A-938335E0FAFD}" type="datetimeFigureOut">
               <a:rPr lang="fi-FI" smtClean="0"/>
-              <a:t>18.11.2023</a:t>
+              <a:t>28.11.2023</a:t>
             </a:fld>
             <a:endParaRPr lang="fi-FI"/>
           </a:p>
@@ -680,7 +680,7 @@
           <a:p>
             <a:fld id="{4B690704-11ED-4B08-A18A-938335E0FAFD}" type="datetimeFigureOut">
               <a:rPr lang="fi-FI" smtClean="0"/>
-              <a:t>18.11.2023</a:t>
+              <a:t>28.11.2023</a:t>
             </a:fld>
             <a:endParaRPr lang="fi-FI"/>
           </a:p>
@@ -880,7 +880,7 @@
           <a:p>
             <a:fld id="{4B690704-11ED-4B08-A18A-938335E0FAFD}" type="datetimeFigureOut">
               <a:rPr lang="fi-FI" smtClean="0"/>
-              <a:t>18.11.2023</a:t>
+              <a:t>28.11.2023</a:t>
             </a:fld>
             <a:endParaRPr lang="fi-FI"/>
           </a:p>
@@ -1156,7 +1156,7 @@
           <a:p>
             <a:fld id="{4B690704-11ED-4B08-A18A-938335E0FAFD}" type="datetimeFigureOut">
               <a:rPr lang="fi-FI" smtClean="0"/>
-              <a:t>18.11.2023</a:t>
+              <a:t>28.11.2023</a:t>
             </a:fld>
             <a:endParaRPr lang="fi-FI"/>
           </a:p>
@@ -1424,7 +1424,7 @@
           <a:p>
             <a:fld id="{4B690704-11ED-4B08-A18A-938335E0FAFD}" type="datetimeFigureOut">
               <a:rPr lang="fi-FI" smtClean="0"/>
-              <a:t>18.11.2023</a:t>
+              <a:t>28.11.2023</a:t>
             </a:fld>
             <a:endParaRPr lang="fi-FI"/>
           </a:p>
@@ -1839,7 +1839,7 @@
           <a:p>
             <a:fld id="{4B690704-11ED-4B08-A18A-938335E0FAFD}" type="datetimeFigureOut">
               <a:rPr lang="fi-FI" smtClean="0"/>
-              <a:t>18.11.2023</a:t>
+              <a:t>28.11.2023</a:t>
             </a:fld>
             <a:endParaRPr lang="fi-FI"/>
           </a:p>
@@ -1981,7 +1981,7 @@
           <a:p>
             <a:fld id="{4B690704-11ED-4B08-A18A-938335E0FAFD}" type="datetimeFigureOut">
               <a:rPr lang="fi-FI" smtClean="0"/>
-              <a:t>18.11.2023</a:t>
+              <a:t>28.11.2023</a:t>
             </a:fld>
             <a:endParaRPr lang="fi-FI"/>
           </a:p>
@@ -2094,7 +2094,7 @@
           <a:p>
             <a:fld id="{4B690704-11ED-4B08-A18A-938335E0FAFD}" type="datetimeFigureOut">
               <a:rPr lang="fi-FI" smtClean="0"/>
-              <a:t>18.11.2023</a:t>
+              <a:t>28.11.2023</a:t>
             </a:fld>
             <a:endParaRPr lang="fi-FI"/>
           </a:p>
@@ -2407,7 +2407,7 @@
           <a:p>
             <a:fld id="{4B690704-11ED-4B08-A18A-938335E0FAFD}" type="datetimeFigureOut">
               <a:rPr lang="fi-FI" smtClean="0"/>
-              <a:t>18.11.2023</a:t>
+              <a:t>28.11.2023</a:t>
             </a:fld>
             <a:endParaRPr lang="fi-FI"/>
           </a:p>
@@ -2696,7 +2696,7 @@
           <a:p>
             <a:fld id="{4B690704-11ED-4B08-A18A-938335E0FAFD}" type="datetimeFigureOut">
               <a:rPr lang="fi-FI" smtClean="0"/>
-              <a:t>18.11.2023</a:t>
+              <a:t>28.11.2023</a:t>
             </a:fld>
             <a:endParaRPr lang="fi-FI"/>
           </a:p>
@@ -2939,7 +2939,7 @@
           <a:p>
             <a:fld id="{4B690704-11ED-4B08-A18A-938335E0FAFD}" type="datetimeFigureOut">
               <a:rPr lang="fi-FI" smtClean="0"/>
-              <a:t>18.11.2023</a:t>
+              <a:t>28.11.2023</a:t>
             </a:fld>
             <a:endParaRPr lang="fi-FI"/>
           </a:p>
@@ -3407,7 +3407,7 @@
           <a:p>
             <a:r>
               <a:rPr lang="fi-FI" dirty="0"/>
-              <a:t>Roope Salminen, Tieto- ja viestintätekniikan koulutus</a:t>
+              <a:t>Roope Salminen, Tieto- ja viestintätekniikan koulutus, TLTITVT21SV</a:t>
             </a:r>
           </a:p>
           <a:p>
@@ -4729,84 +4729,456 @@
           </a:p>
         </p:txBody>
       </p:sp>
-      <p:sp>
-        <p:nvSpPr>
-          <p:cNvPr id="3" name="Content Placeholder 2">
-            <a:extLst>
-              <a:ext uri="{FF2B5EF4-FFF2-40B4-BE49-F238E27FC236}">
-                <a16:creationId xmlns:a16="http://schemas.microsoft.com/office/drawing/2014/main" id="{F08AB368-7121-27A3-F528-AEF2083FAA2A}"/>
-              </a:ext>
-            </a:extLst>
-          </p:cNvPr>
-          <p:cNvSpPr>
-            <a:spLocks noGrp="1"/>
-          </p:cNvSpPr>
-          <p:nvPr>
-            <p:ph idx="1"/>
-          </p:nvPr>
-        </p:nvSpPr>
-        <p:spPr/>
-        <p:txBody>
-          <a:bodyPr>
-            <a:normAutofit fontScale="92500" lnSpcReduction="20000"/>
-          </a:bodyPr>
-          <a:lstStyle/>
-          <a:p>
-            <a:r>
-              <a:rPr lang="fi-FI" dirty="0"/>
-              <a:t>Lohkosalain on salausalgoritmi, joka ottaa syötteenä salausavaimen ja vakiokokoisen selväkielisen lohkon ja tuottaa vakiokokoisen salalohkon</a:t>
-            </a:r>
-          </a:p>
-          <a:p>
-            <a:r>
-              <a:rPr lang="fi-FI" dirty="0"/>
-              <a:t>Lohkosalain on deterministinen ja symmetrinen</a:t>
-            </a:r>
-          </a:p>
-          <a:p>
-            <a:pPr lvl="1"/>
-            <a:r>
-              <a:rPr lang="fi-FI" dirty="0"/>
-              <a:t>Deterministisyys tarkoittaa, että sama syöte (avain, selväkielinen lohko) tuottaa aina saman salalohkon</a:t>
-            </a:r>
-          </a:p>
-          <a:p>
-            <a:pPr lvl="1"/>
-            <a:r>
-              <a:rPr lang="fi-FI" dirty="0"/>
-              <a:t>Symmetrisyys tarkoittaa, että salaukselle on olemassa käänteinen operaatio, jolla alkuperäinen selväkielinen lohko saadaan palautettua samaa avainta käyttämällä</a:t>
-            </a:r>
-          </a:p>
-          <a:p>
-            <a:r>
-              <a:rPr lang="fi-FI" dirty="0"/>
-              <a:t>Lohkosalaimen tärkeimpiä ominaisuuksia ovat lohkon ja salausavaimen koko (bittien määrä)</a:t>
-            </a:r>
-          </a:p>
-          <a:p>
-            <a:pPr lvl="1"/>
-            <a:r>
-              <a:rPr lang="fi-FI" dirty="0"/>
-              <a:t>Avain täytyy olla riittävän iso, jotta väsytyshyökkäys (</a:t>
-            </a:r>
-            <a:r>
-              <a:rPr lang="fi-FI" dirty="0" err="1"/>
-              <a:t>brute-force</a:t>
-            </a:r>
-            <a:r>
-              <a:rPr lang="fi-FI" dirty="0"/>
-              <a:t>) ei ole varteenotettava vaihtoehto</a:t>
-            </a:r>
-          </a:p>
-          <a:p>
-            <a:pPr lvl="1"/>
-            <a:r>
-              <a:rPr lang="fi-FI" dirty="0"/>
-              <a:t>Lohkon täytyy olla riittävän iso jotta törmäystodennäköisyys pysyy riittävän pienenä huolimatta käytettävästä moodista. Isompi lohko suurentaa myös salattavan tiedoston maksimikokoa</a:t>
-            </a:r>
-          </a:p>
-        </p:txBody>
-      </p:sp>
+      <mc:AlternateContent xmlns:mc="http://schemas.openxmlformats.org/markup-compatibility/2006">
+        <mc:Choice xmlns:a14="http://schemas.microsoft.com/office/drawing/2010/main" Requires="a14">
+          <p:sp>
+            <p:nvSpPr>
+              <p:cNvPr id="3" name="Content Placeholder 2">
+                <a:extLst>
+                  <a:ext uri="{FF2B5EF4-FFF2-40B4-BE49-F238E27FC236}">
+                    <a16:creationId xmlns:a16="http://schemas.microsoft.com/office/drawing/2014/main" id="{F08AB368-7121-27A3-F528-AEF2083FAA2A}"/>
+                  </a:ext>
+                </a:extLst>
+              </p:cNvPr>
+              <p:cNvSpPr>
+                <a:spLocks noGrp="1"/>
+              </p:cNvSpPr>
+              <p:nvPr>
+                <p:ph idx="1"/>
+              </p:nvPr>
+            </p:nvSpPr>
+            <p:spPr/>
+            <p:txBody>
+              <a:bodyPr>
+                <a:normAutofit fontScale="70000" lnSpcReduction="20000"/>
+              </a:bodyPr>
+              <a:lstStyle/>
+              <a:p>
+                <a:r>
+                  <a:rPr lang="fi-FI" dirty="0"/>
+                  <a:t>Lohkosalain on salausalgoritmi, joka ottaa syötteenä salausavaimen ja vakiokokoisen selväkielisen lohkon ja tuottaa vakiokokoisen salalohkon</a:t>
+                </a:r>
+              </a:p>
+              <a:p>
+                <a:r>
+                  <a:rPr lang="fi-FI" dirty="0"/>
+                  <a:t>Lohkosalain on deterministinen ja kääntyvä</a:t>
+                </a:r>
+              </a:p>
+              <a:p>
+                <a:pPr lvl="1"/>
+                <a:r>
+                  <a:rPr lang="fi-FI" dirty="0"/>
+                  <a:t>Deterministisyys tarkoittaa, että sama syöte (avain, selväkielinen lohko) tuottaa aina saman salalohkon</a:t>
+                </a:r>
+              </a:p>
+              <a:p>
+                <a:pPr lvl="1"/>
+                <a:r>
+                  <a:rPr lang="fi-FI"/>
+                  <a:t>Kääntyvyys </a:t>
+                </a:r>
+                <a:r>
+                  <a:rPr lang="fi-FI" dirty="0"/>
+                  <a:t>tarkoittaa, että salaukselle on olemassa käänteinen operaatio, jolla alkuperäinen selväkielinen lohko saadaan palautettua samaa avainta käyttämällä</a:t>
+                </a:r>
+              </a:p>
+              <a:p>
+                <a:pPr lvl="1"/>
+                <a14:m>
+                  <m:oMath xmlns:m="http://schemas.openxmlformats.org/officeDocument/2006/math">
+                    <m:r>
+                      <a:rPr lang="en-GB" sz="2400" i="1" smtClean="0">
+                        <a:effectLst/>
+                        <a:latin typeface="Cambria Math" panose="02040503050406030204" pitchFamily="18" charset="0"/>
+                        <a:ea typeface="Yu Mincho" panose="02020400000000000000" pitchFamily="18" charset="-128"/>
+                        <a:cs typeface="Arial" panose="020B0604020202020204" pitchFamily="34" charset="0"/>
+                      </a:rPr>
+                      <m:t>∀</m:t>
+                    </m:r>
+                    <m:r>
+                      <a:rPr lang="en-GB" sz="2400" i="1" smtClean="0">
+                        <a:effectLst/>
+                        <a:latin typeface="Cambria Math" panose="02040503050406030204" pitchFamily="18" charset="0"/>
+                        <a:ea typeface="Yu Mincho" panose="02020400000000000000" pitchFamily="18" charset="-128"/>
+                        <a:cs typeface="Arial" panose="020B0604020202020204" pitchFamily="34" charset="0"/>
+                      </a:rPr>
+                      <m:t>𝑃</m:t>
+                    </m:r>
+                    <m:r>
+                      <a:rPr lang="en-GB" sz="2400" i="1" smtClean="0">
+                        <a:effectLst/>
+                        <a:latin typeface="Cambria Math" panose="02040503050406030204" pitchFamily="18" charset="0"/>
+                        <a:ea typeface="Yu Mincho" panose="02020400000000000000" pitchFamily="18" charset="-128"/>
+                        <a:cs typeface="Arial" panose="020B0604020202020204" pitchFamily="34" charset="0"/>
+                      </a:rPr>
+                      <m:t>:</m:t>
+                    </m:r>
+                    <m:sSub>
+                      <m:sSubPr>
+                        <m:ctrlPr>
+                          <a:rPr lang="fi-FI" sz="2400" b="0" i="1" smtClean="0">
+                            <a:effectLst/>
+                            <a:latin typeface="Cambria Math" panose="02040503050406030204" pitchFamily="18" charset="0"/>
+                            <a:ea typeface="Yu Mincho" panose="02020400000000000000" pitchFamily="18" charset="-128"/>
+                            <a:cs typeface="Arial" panose="020B0604020202020204" pitchFamily="34" charset="0"/>
+                          </a:rPr>
+                        </m:ctrlPr>
+                      </m:sSubPr>
+                      <m:e>
+                        <m:r>
+                          <a:rPr lang="en-GB" sz="2400" i="1" smtClean="0">
+                            <a:effectLst/>
+                            <a:latin typeface="Cambria Math" panose="02040503050406030204" pitchFamily="18" charset="0"/>
+                            <a:ea typeface="Yu Mincho" panose="02020400000000000000" pitchFamily="18" charset="-128"/>
+                            <a:cs typeface="Arial" panose="020B0604020202020204" pitchFamily="34" charset="0"/>
+                          </a:rPr>
+                          <m:t>𝐷</m:t>
+                        </m:r>
+                      </m:e>
+                      <m:sub>
+                        <m:r>
+                          <a:rPr lang="fi-FI" sz="2400" b="0" i="1" smtClean="0">
+                            <a:effectLst/>
+                            <a:latin typeface="Cambria Math" panose="02040503050406030204" pitchFamily="18" charset="0"/>
+                            <a:ea typeface="Yu Mincho" panose="02020400000000000000" pitchFamily="18" charset="-128"/>
+                            <a:cs typeface="Arial" panose="020B0604020202020204" pitchFamily="34" charset="0"/>
+                          </a:rPr>
+                          <m:t>𝐾</m:t>
+                        </m:r>
+                      </m:sub>
+                    </m:sSub>
+                    <m:d>
+                      <m:dPr>
+                        <m:ctrlPr>
+                          <a:rPr lang="fi-FI" i="1">
+                            <a:effectLst/>
+                            <a:latin typeface="Cambria Math" panose="02040503050406030204" pitchFamily="18" charset="0"/>
+                            <a:ea typeface="Yu Mincho" panose="02020400000000000000" pitchFamily="18" charset="-128"/>
+                          </a:rPr>
+                        </m:ctrlPr>
+                      </m:dPr>
+                      <m:e>
+                        <m:sSub>
+                          <m:sSubPr>
+                            <m:ctrlPr>
+                              <a:rPr lang="fi-FI" sz="2400" b="0" i="1" smtClean="0">
+                                <a:effectLst/>
+                                <a:latin typeface="Cambria Math" panose="02040503050406030204" pitchFamily="18" charset="0"/>
+                                <a:ea typeface="Yu Mincho" panose="02020400000000000000" pitchFamily="18" charset="-128"/>
+                                <a:cs typeface="Arial" panose="020B0604020202020204" pitchFamily="34" charset="0"/>
+                              </a:rPr>
+                            </m:ctrlPr>
+                          </m:sSubPr>
+                          <m:e>
+                            <m:r>
+                              <a:rPr lang="en-GB" sz="2400" i="1">
+                                <a:effectLst/>
+                                <a:latin typeface="Cambria Math" panose="02040503050406030204" pitchFamily="18" charset="0"/>
+                                <a:ea typeface="Yu Mincho" panose="02020400000000000000" pitchFamily="18" charset="-128"/>
+                                <a:cs typeface="Arial" panose="020B0604020202020204" pitchFamily="34" charset="0"/>
+                              </a:rPr>
+                              <m:t>𝐸</m:t>
+                            </m:r>
+                          </m:e>
+                          <m:sub>
+                            <m:r>
+                              <a:rPr lang="fi-FI" sz="2400" b="0" i="1" smtClean="0">
+                                <a:effectLst/>
+                                <a:latin typeface="Cambria Math" panose="02040503050406030204" pitchFamily="18" charset="0"/>
+                                <a:ea typeface="Yu Mincho" panose="02020400000000000000" pitchFamily="18" charset="-128"/>
+                                <a:cs typeface="Arial" panose="020B0604020202020204" pitchFamily="34" charset="0"/>
+                              </a:rPr>
+                              <m:t>𝐾</m:t>
+                            </m:r>
+                          </m:sub>
+                        </m:sSub>
+                        <m:d>
+                          <m:dPr>
+                            <m:ctrlPr>
+                              <a:rPr lang="fi-FI" i="1">
+                                <a:effectLst/>
+                                <a:latin typeface="Cambria Math" panose="02040503050406030204" pitchFamily="18" charset="0"/>
+                                <a:ea typeface="Yu Mincho" panose="02020400000000000000" pitchFamily="18" charset="-128"/>
+                              </a:rPr>
+                            </m:ctrlPr>
+                          </m:dPr>
+                          <m:e>
+                            <m:r>
+                              <a:rPr lang="en-GB" sz="2400" i="1">
+                                <a:effectLst/>
+                                <a:latin typeface="Cambria Math" panose="02040503050406030204" pitchFamily="18" charset="0"/>
+                                <a:ea typeface="Yu Mincho" panose="02020400000000000000" pitchFamily="18" charset="-128"/>
+                                <a:cs typeface="Arial" panose="020B0604020202020204" pitchFamily="34" charset="0"/>
+                              </a:rPr>
+                              <m:t>𝑃</m:t>
+                            </m:r>
+                          </m:e>
+                        </m:d>
+                      </m:e>
+                    </m:d>
+                    <m:r>
+                      <a:rPr lang="en-GB" sz="2400" i="1">
+                        <a:effectLst/>
+                        <a:latin typeface="Cambria Math" panose="02040503050406030204" pitchFamily="18" charset="0"/>
+                        <a:ea typeface="Yu Mincho" panose="02020400000000000000" pitchFamily="18" charset="-128"/>
+                        <a:cs typeface="Arial" panose="020B0604020202020204" pitchFamily="34" charset="0"/>
+                      </a:rPr>
+                      <m:t>=</m:t>
+                    </m:r>
+                    <m:r>
+                      <a:rPr lang="en-GB" sz="2400" i="1">
+                        <a:effectLst/>
+                        <a:latin typeface="Cambria Math" panose="02040503050406030204" pitchFamily="18" charset="0"/>
+                        <a:ea typeface="Yu Mincho" panose="02020400000000000000" pitchFamily="18" charset="-128"/>
+                        <a:cs typeface="Arial" panose="020B0604020202020204" pitchFamily="34" charset="0"/>
+                      </a:rPr>
+                      <m:t>𝑃</m:t>
+                    </m:r>
+                  </m:oMath>
+                </a14:m>
+                <a:endParaRPr lang="fi-FI" dirty="0"/>
+              </a:p>
+              <a:p>
+                <a:r>
+                  <a:rPr lang="fi-FI" dirty="0"/>
+                  <a:t>Lohkosalaimen tärkeimpiä ominaisuuksia ovat lohkon ja salausavaimen koko (bittien määrä)</a:t>
+                </a:r>
+              </a:p>
+              <a:p>
+                <a:pPr lvl="1"/>
+                <a:r>
+                  <a:rPr lang="fi-FI" dirty="0"/>
+                  <a:t>Avain täytyy olla riittävän iso, jotta väsytyshyökkäys (</a:t>
+                </a:r>
+                <a:r>
+                  <a:rPr lang="fi-FI" dirty="0" err="1"/>
+                  <a:t>brute-force</a:t>
+                </a:r>
+                <a:r>
+                  <a:rPr lang="fi-FI" dirty="0"/>
+                  <a:t>) ei ole varteenotettava vaihtoehto</a:t>
+                </a:r>
+              </a:p>
+              <a:p>
+                <a:pPr lvl="1"/>
+                <a:r>
+                  <a:rPr lang="fi-FI" dirty="0"/>
+                  <a:t>Lohkon täytyy olla riittävän iso jotta törmäystodennäköisyys pysyy riittävän pienenä huolimatta käytettävästä moodista. Törmäys tässä yhteydessä tapahtuma, jossa </a:t>
+                </a:r>
+                <a:r>
+                  <a:rPr lang="fi-FI" u="sng" dirty="0"/>
+                  <a:t>moodin toiminta </a:t>
+                </a:r>
+                <a:r>
+                  <a:rPr lang="fi-FI" dirty="0"/>
+                  <a:t>aiheuttaa sen, että kaksi salalohkoa sattumalta identtiset. </a:t>
+                </a:r>
+              </a:p>
+              <a:p>
+                <a:pPr lvl="1"/>
+                <a:r>
+                  <a:rPr lang="fi-FI" dirty="0" err="1"/>
+                  <a:t>Birthday</a:t>
+                </a:r>
+                <a:r>
+                  <a:rPr lang="fi-FI" dirty="0"/>
+                  <a:t> </a:t>
+                </a:r>
+                <a:r>
+                  <a:rPr lang="fi-FI" dirty="0" err="1"/>
+                  <a:t>bound</a:t>
+                </a:r>
+                <a:r>
+                  <a:rPr lang="fi-FI" dirty="0"/>
+                  <a:t> </a:t>
+                </a:r>
+                <a14:m>
+                  <m:oMath xmlns:m="http://schemas.openxmlformats.org/officeDocument/2006/math">
+                    <m:r>
+                      <a:rPr lang="fi-FI" i="1" smtClean="0">
+                        <a:latin typeface="Cambria Math" panose="02040503050406030204" pitchFamily="18" charset="0"/>
+                        <a:ea typeface="Cambria Math" panose="02040503050406030204" pitchFamily="18" charset="0"/>
+                      </a:rPr>
+                      <m:t>⇒</m:t>
+                    </m:r>
+                  </m:oMath>
+                </a14:m>
+                <a:r>
+                  <a:rPr lang="fi-FI" dirty="0"/>
+                  <a:t> törmäys odotettavissa ”suurella” tn. noin </a:t>
+                </a:r>
+                <a14:m>
+                  <m:oMath xmlns:m="http://schemas.openxmlformats.org/officeDocument/2006/math">
+                    <m:rad>
+                      <m:radPr>
+                        <m:degHide m:val="on"/>
+                        <m:ctrlPr>
+                          <a:rPr lang="fi-FI" b="0" i="1" smtClean="0">
+                            <a:latin typeface="Cambria Math" panose="02040503050406030204" pitchFamily="18" charset="0"/>
+                            <a:ea typeface="Cambria Math" panose="02040503050406030204" pitchFamily="18" charset="0"/>
+                          </a:rPr>
+                        </m:ctrlPr>
+                      </m:radPr>
+                      <m:deg/>
+                      <m:e>
+                        <m:sSup>
+                          <m:sSupPr>
+                            <m:ctrlPr>
+                              <a:rPr lang="fi-FI" b="0" i="1" smtClean="0">
+                                <a:latin typeface="Cambria Math" panose="02040503050406030204" pitchFamily="18" charset="0"/>
+                                <a:ea typeface="Cambria Math" panose="02040503050406030204" pitchFamily="18" charset="0"/>
+                              </a:rPr>
+                            </m:ctrlPr>
+                          </m:sSupPr>
+                          <m:e>
+                            <m:r>
+                              <a:rPr lang="fi-FI" b="0" i="1" smtClean="0">
+                                <a:latin typeface="Cambria Math" panose="02040503050406030204" pitchFamily="18" charset="0"/>
+                                <a:ea typeface="Cambria Math" panose="02040503050406030204" pitchFamily="18" charset="0"/>
+                              </a:rPr>
+                              <m:t>2</m:t>
+                            </m:r>
+                          </m:e>
+                          <m:sup>
+                            <m:r>
+                              <a:rPr lang="fi-FI" b="0" i="1" smtClean="0">
+                                <a:latin typeface="Cambria Math" panose="02040503050406030204" pitchFamily="18" charset="0"/>
+                                <a:ea typeface="Cambria Math" panose="02040503050406030204" pitchFamily="18" charset="0"/>
+                              </a:rPr>
+                              <m:t>𝑛</m:t>
+                            </m:r>
+                          </m:sup>
+                        </m:sSup>
+                      </m:e>
+                    </m:rad>
+                    <m:r>
+                      <a:rPr lang="fi-FI" b="0" i="1" smtClean="0">
+                        <a:latin typeface="Cambria Math" panose="02040503050406030204" pitchFamily="18" charset="0"/>
+                        <a:ea typeface="Cambria Math" panose="02040503050406030204" pitchFamily="18" charset="0"/>
+                      </a:rPr>
+                      <m:t>=</m:t>
+                    </m:r>
+                    <m:sSup>
+                      <m:sSupPr>
+                        <m:ctrlPr>
+                          <a:rPr lang="fi-FI" b="0" i="1" smtClean="0">
+                            <a:latin typeface="Cambria Math" panose="02040503050406030204" pitchFamily="18" charset="0"/>
+                            <a:ea typeface="Cambria Math" panose="02040503050406030204" pitchFamily="18" charset="0"/>
+                          </a:rPr>
+                        </m:ctrlPr>
+                      </m:sSupPr>
+                      <m:e>
+                        <m:r>
+                          <a:rPr lang="fi-FI" b="0" i="1" smtClean="0">
+                            <a:latin typeface="Cambria Math" panose="02040503050406030204" pitchFamily="18" charset="0"/>
+                            <a:ea typeface="Cambria Math" panose="02040503050406030204" pitchFamily="18" charset="0"/>
+                          </a:rPr>
+                          <m:t>2</m:t>
+                        </m:r>
+                      </m:e>
+                      <m:sup>
+                        <m:r>
+                          <a:rPr lang="fi-FI" b="0" i="1" smtClean="0">
+                            <a:latin typeface="Cambria Math" panose="02040503050406030204" pitchFamily="18" charset="0"/>
+                            <a:ea typeface="Cambria Math" panose="02040503050406030204" pitchFamily="18" charset="0"/>
+                          </a:rPr>
+                          <m:t>𝑛</m:t>
+                        </m:r>
+                        <m:r>
+                          <a:rPr lang="fi-FI" b="0" i="1" smtClean="0">
+                            <a:latin typeface="Cambria Math" panose="02040503050406030204" pitchFamily="18" charset="0"/>
+                            <a:ea typeface="Cambria Math" panose="02040503050406030204" pitchFamily="18" charset="0"/>
+                          </a:rPr>
+                          <m:t>/2</m:t>
+                        </m:r>
+                      </m:sup>
+                    </m:sSup>
+                  </m:oMath>
+                </a14:m>
+                <a:r>
+                  <a:rPr lang="fi-FI" dirty="0"/>
+                  <a:t> lohkon salauksen jälkeen, missä </a:t>
+                </a:r>
+                <a14:m>
+                  <m:oMath xmlns:m="http://schemas.openxmlformats.org/officeDocument/2006/math">
+                    <m:r>
+                      <a:rPr lang="fi-FI" b="0" i="1" smtClean="0">
+                        <a:latin typeface="Cambria Math" panose="02040503050406030204" pitchFamily="18" charset="0"/>
+                      </a:rPr>
+                      <m:t>𝑛</m:t>
+                    </m:r>
+                  </m:oMath>
+                </a14:m>
+                <a:r>
+                  <a:rPr lang="fi-FI" dirty="0"/>
+                  <a:t> on lohkon koko. Eli avain vaihdettava hyvissä ajoin ennen tätä</a:t>
+                </a:r>
+              </a:p>
+              <a:p>
+                <a:pPr lvl="1"/>
+                <a:r>
+                  <a:rPr lang="fi-FI" dirty="0"/>
+                  <a:t>Isompi lohko suurentaa myös salattavan tiedoston maksimikokoa</a:t>
+                </a:r>
+              </a:p>
+              <a:p>
+                <a:r>
+                  <a:rPr lang="fi-FI" dirty="0"/>
+                  <a:t>Käytännössä tarvitaan aina jokin toimintamoodi, joka määrittää kuinka </a:t>
+                </a:r>
+                <a:r>
+                  <a:rPr lang="fi-FI" dirty="0" err="1"/>
+                  <a:t>lohkosalainta</a:t>
+                </a:r>
+                <a:r>
+                  <a:rPr lang="fi-FI" dirty="0"/>
+                  <a:t> sovelletaan lohkon koon ylittäviin viesteihin</a:t>
+                </a:r>
+              </a:p>
+            </p:txBody>
+          </p:sp>
+        </mc:Choice>
+        <mc:Fallback>
+          <p:sp>
+            <p:nvSpPr>
+              <p:cNvPr id="3" name="Content Placeholder 2">
+                <a:extLst>
+                  <a:ext uri="{FF2B5EF4-FFF2-40B4-BE49-F238E27FC236}">
+                    <a16:creationId xmlns:a16="http://schemas.microsoft.com/office/drawing/2014/main" id="{F08AB368-7121-27A3-F528-AEF2083FAA2A}"/>
+                  </a:ext>
+                </a:extLst>
+              </p:cNvPr>
+              <p:cNvSpPr>
+                <a:spLocks noGrp="1" noRot="1" noChangeAspect="1" noMove="1" noResize="1" noEditPoints="1" noAdjustHandles="1" noChangeArrowheads="1" noChangeShapeType="1" noTextEdit="1"/>
+              </p:cNvSpPr>
+              <p:nvPr>
+                <p:ph idx="1"/>
+              </p:nvPr>
+            </p:nvSpPr>
+            <p:spPr>
+              <a:blipFill>
+                <a:blip r:embed="rId2"/>
+                <a:stretch>
+                  <a:fillRect l="-522" t="-2521" r="-464" b="-1401"/>
+                </a:stretch>
+              </a:blipFill>
+            </p:spPr>
+            <p:txBody>
+              <a:bodyPr/>
+              <a:lstStyle/>
+              <a:p>
+                <a:r>
+                  <a:rPr lang="fi-FI">
+                    <a:noFill/>
+                  </a:rPr>
+                  <a:t> </a:t>
+                </a:r>
+              </a:p>
+            </p:txBody>
+          </p:sp>
+        </mc:Fallback>
+      </mc:AlternateContent>
     </p:spTree>
     <p:extLst>
       <p:ext uri="{BB962C8B-B14F-4D97-AF65-F5344CB8AC3E}">
@@ -4866,66 +5238,378 @@
           </a:p>
         </p:txBody>
       </p:sp>
-      <p:sp>
-        <p:nvSpPr>
-          <p:cNvPr id="3" name="Content Placeholder 2">
-            <a:extLst>
-              <a:ext uri="{FF2B5EF4-FFF2-40B4-BE49-F238E27FC236}">
-                <a16:creationId xmlns:a16="http://schemas.microsoft.com/office/drawing/2014/main" id="{5230BB5D-30F4-C465-4557-AB23115D420B}"/>
-              </a:ext>
-            </a:extLst>
-          </p:cNvPr>
-          <p:cNvSpPr>
-            <a:spLocks noGrp="1"/>
-          </p:cNvSpPr>
-          <p:nvPr>
-            <p:ph sz="half" idx="1"/>
-          </p:nvPr>
-        </p:nvSpPr>
-        <p:spPr>
-          <a:xfrm>
-            <a:off x="6096000" y="1690688"/>
-            <a:ext cx="5181600" cy="4351338"/>
-          </a:xfrm>
-        </p:spPr>
-        <p:txBody>
-          <a:bodyPr>
-            <a:normAutofit fontScale="62500" lnSpcReduction="20000"/>
-          </a:bodyPr>
-          <a:lstStyle/>
-          <a:p>
-            <a:r>
-              <a:rPr lang="fi-FI"/>
-              <a:t>Yksinkertainen moodi, jossa salalohkot tuotetaan yksinkertaisesti ajamalla selvälohkot suoraan lohkosalaimen läpi</a:t>
-            </a:r>
-          </a:p>
-          <a:p>
-            <a:r>
-              <a:rPr lang="fi-FI"/>
-              <a:t>Viimeinen selvälohko vaatii päddäystä, jos se ei ole täysi lohko (lohkosalain käsittelee ainoastaan täysiä lohkoja)</a:t>
-            </a:r>
-          </a:p>
-          <a:p>
-            <a:r>
-              <a:rPr lang="fi-FI"/>
-              <a:t>Ei diffuusiota. Jos käytettään samaa avainta, identtiset selväkieliset tekstit tuottavat identtiset salatekstit. Myös toistuvat fraasit saman tekstin sisällä tuottavat toistoa salatekstin sisällä</a:t>
-            </a:r>
-          </a:p>
-          <a:p>
-            <a:r>
-              <a:rPr lang="fi-FI"/>
-              <a:t>Ei kannata käyttää missään käytännön sovelluksessa, salateksti paljastaa liikaa selväkielisestä tekstistä</a:t>
-            </a:r>
-          </a:p>
-          <a:p>
-            <a:r>
-              <a:rPr lang="fi-FI"/>
-              <a:t>Klassikkodemonstraatio on kuvan salaaminen ECB-moodilla. Kuvasta näkee helposti mitä salaamaton kuva esittää, vaikka itse lohkosalain olisikin turvallinen (esim. AES)</a:t>
-            </a:r>
-            <a:endParaRPr lang="fi-FI" dirty="0"/>
-          </a:p>
-        </p:txBody>
-      </p:sp>
+      <mc:AlternateContent xmlns:mc="http://schemas.openxmlformats.org/markup-compatibility/2006" xmlns:a14="http://schemas.microsoft.com/office/drawing/2010/main">
+        <mc:Choice Requires="a14">
+          <p:sp>
+            <p:nvSpPr>
+              <p:cNvPr id="3" name="Content Placeholder 2">
+                <a:extLst>
+                  <a:ext uri="{FF2B5EF4-FFF2-40B4-BE49-F238E27FC236}">
+                    <a16:creationId xmlns:a16="http://schemas.microsoft.com/office/drawing/2014/main" id="{5230BB5D-30F4-C465-4557-AB23115D420B}"/>
+                  </a:ext>
+                </a:extLst>
+              </p:cNvPr>
+              <p:cNvSpPr>
+                <a:spLocks noGrp="1"/>
+              </p:cNvSpPr>
+              <p:nvPr>
+                <p:ph sz="half" idx="1"/>
+              </p:nvPr>
+            </p:nvSpPr>
+            <p:spPr>
+              <a:xfrm>
+                <a:off x="6096000" y="1690688"/>
+                <a:ext cx="5181600" cy="4351338"/>
+              </a:xfrm>
+            </p:spPr>
+            <p:txBody>
+              <a:bodyPr>
+                <a:normAutofit fontScale="55000" lnSpcReduction="20000"/>
+              </a:bodyPr>
+              <a:lstStyle/>
+              <a:p>
+                <a:r>
+                  <a:rPr lang="fi-FI" dirty="0"/>
+                  <a:t>Yksinkertainen moodi, jossa salalohkot tuotetaan yksinkertaisesti ajamalla selvälohkot suoraan lohkosalaimen läpi</a:t>
+                </a:r>
+              </a:p>
+              <a:p>
+                <a:r>
+                  <a:rPr lang="fi-FI" dirty="0"/>
+                  <a:t>Viimeinen selvälohko vaatii </a:t>
+                </a:r>
+                <a:r>
+                  <a:rPr lang="fi-FI" dirty="0" err="1"/>
+                  <a:t>päddäystä</a:t>
+                </a:r>
+                <a:r>
+                  <a:rPr lang="fi-FI" dirty="0"/>
+                  <a:t>, jos se ei ole täysi lohko (lohkosalain käsittelee ainoastaan täysiä lohkoja)</a:t>
+                </a:r>
+              </a:p>
+              <a:p>
+                <a:r>
+                  <a:rPr lang="fi-FI" dirty="0"/>
+                  <a:t>Ei diffuusiota. Jos käytettään samaa avainta, identtiset selväkieliset tekstit tuottavat identtiset salatekstit. Myös toistuvat fraasit saman tekstin sisällä tuottavat toistoa salatekstin sisällä</a:t>
+                </a:r>
+              </a:p>
+              <a:p>
+                <a:r>
+                  <a:rPr lang="fi-FI" dirty="0"/>
+                  <a:t>Ei kannata käyttää missään käytännön sovelluksessa, salateksti paljastaa liikaa selväkielisestä tekstistä</a:t>
+                </a:r>
+              </a:p>
+              <a:p>
+                <a:r>
+                  <a:rPr lang="fi-FI" dirty="0"/>
+                  <a:t>Klassikkodemonstraatio on kuvan salaaminen ECB-moodilla. Kuvasta näkee helposti mitä salaamaton kuva esittää, vaikka itse lohkosalain olisikin turvallinen (esim. AES)</a:t>
+                </a:r>
+              </a:p>
+              <a:p>
+                <a14:m>
+                  <m:oMath xmlns:m="http://schemas.openxmlformats.org/officeDocument/2006/math">
+                    <m:sSub>
+                      <m:sSubPr>
+                        <m:ctrlPr>
+                          <a:rPr lang="fi-FI" b="0" i="1" smtClean="0">
+                            <a:latin typeface="Cambria Math" panose="02040503050406030204" pitchFamily="18" charset="0"/>
+                          </a:rPr>
+                        </m:ctrlPr>
+                      </m:sSubPr>
+                      <m:e>
+                        <m:r>
+                          <a:rPr lang="fi-FI" b="0" i="1" smtClean="0">
+                            <a:latin typeface="Cambria Math" panose="02040503050406030204" pitchFamily="18" charset="0"/>
+                          </a:rPr>
+                          <m:t>𝐶</m:t>
+                        </m:r>
+                      </m:e>
+                      <m:sub>
+                        <m:r>
+                          <a:rPr lang="fi-FI" b="0" i="1" smtClean="0">
+                            <a:latin typeface="Cambria Math" panose="02040503050406030204" pitchFamily="18" charset="0"/>
+                          </a:rPr>
+                          <m:t>𝑖</m:t>
+                        </m:r>
+                      </m:sub>
+                    </m:sSub>
+                    <m:r>
+                      <a:rPr lang="fi-FI" i="1">
+                        <a:latin typeface="Cambria Math" panose="02040503050406030204" pitchFamily="18" charset="0"/>
+                      </a:rPr>
+                      <m:t>=</m:t>
+                    </m:r>
+                    <m:sSub>
+                      <m:sSubPr>
+                        <m:ctrlPr>
+                          <a:rPr lang="fi-FI" i="1">
+                            <a:latin typeface="Cambria Math" panose="02040503050406030204" pitchFamily="18" charset="0"/>
+                          </a:rPr>
+                        </m:ctrlPr>
+                      </m:sSubPr>
+                      <m:e>
+                        <m:r>
+                          <a:rPr lang="fi-FI" i="1">
+                            <a:latin typeface="Cambria Math" panose="02040503050406030204" pitchFamily="18" charset="0"/>
+                          </a:rPr>
+                          <m:t>𝐸</m:t>
+                        </m:r>
+                      </m:e>
+                      <m:sub>
+                        <m:r>
+                          <a:rPr lang="fi-FI" i="1">
+                            <a:latin typeface="Cambria Math" panose="02040503050406030204" pitchFamily="18" charset="0"/>
+                          </a:rPr>
+                          <m:t>𝐾</m:t>
+                        </m:r>
+                      </m:sub>
+                    </m:sSub>
+                    <m:d>
+                      <m:dPr>
+                        <m:ctrlPr>
+                          <a:rPr lang="fi-FI" i="1">
+                            <a:latin typeface="Cambria Math" panose="02040503050406030204" pitchFamily="18" charset="0"/>
+                          </a:rPr>
+                        </m:ctrlPr>
+                      </m:dPr>
+                      <m:e>
+                        <m:sSub>
+                          <m:sSubPr>
+                            <m:ctrlPr>
+                              <a:rPr lang="fi-FI" i="1">
+                                <a:latin typeface="Cambria Math" panose="02040503050406030204" pitchFamily="18" charset="0"/>
+                              </a:rPr>
+                            </m:ctrlPr>
+                          </m:sSubPr>
+                          <m:e>
+                            <m:r>
+                              <a:rPr lang="fi-FI" i="1">
+                                <a:latin typeface="Cambria Math" panose="02040503050406030204" pitchFamily="18" charset="0"/>
+                              </a:rPr>
+                              <m:t>𝑃</m:t>
+                            </m:r>
+                          </m:e>
+                          <m:sub>
+                            <m:r>
+                              <a:rPr lang="fi-FI" i="1">
+                                <a:latin typeface="Cambria Math" panose="02040503050406030204" pitchFamily="18" charset="0"/>
+                              </a:rPr>
+                              <m:t>𝑖</m:t>
+                            </m:r>
+                          </m:sub>
+                        </m:sSub>
+                      </m:e>
+                    </m:d>
+                    <m:r>
+                      <a:rPr lang="fi-FI" i="1">
+                        <a:latin typeface="Cambria Math" panose="02040503050406030204" pitchFamily="18" charset="0"/>
+                      </a:rPr>
+                      <m:t>,</m:t>
+                    </m:r>
+                  </m:oMath>
+                </a14:m>
+                <a:r>
+                  <a:rPr lang="fi-FI" b="0" i="1" dirty="0">
+                    <a:latin typeface="Cambria Math" panose="02040503050406030204" pitchFamily="18" charset="0"/>
+                  </a:rPr>
+                  <a:t> </a:t>
+                </a:r>
+                <a14:m>
+                  <m:oMath xmlns:m="http://schemas.openxmlformats.org/officeDocument/2006/math">
+                    <m:r>
+                      <a:rPr lang="fi-FI" i="1">
+                        <a:latin typeface="Cambria Math" panose="02040503050406030204" pitchFamily="18" charset="0"/>
+                      </a:rPr>
+                      <m:t>𝑖</m:t>
+                    </m:r>
+                    <m:r>
+                      <a:rPr lang="fi-FI" i="1">
+                        <a:latin typeface="Cambria Math" panose="02040503050406030204" pitchFamily="18" charset="0"/>
+                      </a:rPr>
+                      <m:t>=1,2,…,</m:t>
+                    </m:r>
+                    <m:r>
+                      <a:rPr lang="fi-FI" i="1">
+                        <a:latin typeface="Cambria Math" panose="02040503050406030204" pitchFamily="18" charset="0"/>
+                      </a:rPr>
+                      <m:t>𝑛</m:t>
+                    </m:r>
+                  </m:oMath>
+                </a14:m>
+                <a:endParaRPr lang="fi-FI" b="0" i="1" dirty="0">
+                  <a:latin typeface="Cambria Math" panose="02040503050406030204" pitchFamily="18" charset="0"/>
+                </a:endParaRPr>
+              </a:p>
+              <a:p>
+                <a14:m>
+                  <m:oMath xmlns:m="http://schemas.openxmlformats.org/officeDocument/2006/math">
+                    <m:sSub>
+                      <m:sSubPr>
+                        <m:ctrlPr>
+                          <a:rPr lang="fi-FI" b="0" i="1" smtClean="0">
+                            <a:latin typeface="Cambria Math" panose="02040503050406030204" pitchFamily="18" charset="0"/>
+                          </a:rPr>
+                        </m:ctrlPr>
+                      </m:sSubPr>
+                      <m:e>
+                        <m:r>
+                          <a:rPr lang="fi-FI" b="0" i="1" smtClean="0">
+                            <a:latin typeface="Cambria Math" panose="02040503050406030204" pitchFamily="18" charset="0"/>
+                          </a:rPr>
+                          <m:t>𝑃</m:t>
+                        </m:r>
+                      </m:e>
+                      <m:sub>
+                        <m:r>
+                          <a:rPr lang="fi-FI" b="0" i="1" smtClean="0">
+                            <a:latin typeface="Cambria Math" panose="02040503050406030204" pitchFamily="18" charset="0"/>
+                          </a:rPr>
+                          <m:t>𝑖</m:t>
+                        </m:r>
+                      </m:sub>
+                    </m:sSub>
+                    <m:r>
+                      <a:rPr lang="fi-FI" i="1">
+                        <a:latin typeface="Cambria Math" panose="02040503050406030204" pitchFamily="18" charset="0"/>
+                      </a:rPr>
+                      <m:t>=</m:t>
+                    </m:r>
+                    <m:sSub>
+                      <m:sSubPr>
+                        <m:ctrlPr>
+                          <a:rPr lang="fi-FI" i="1">
+                            <a:latin typeface="Cambria Math" panose="02040503050406030204" pitchFamily="18" charset="0"/>
+                          </a:rPr>
+                        </m:ctrlPr>
+                      </m:sSubPr>
+                      <m:e>
+                        <m:r>
+                          <a:rPr lang="fi-FI" i="1">
+                            <a:latin typeface="Cambria Math" panose="02040503050406030204" pitchFamily="18" charset="0"/>
+                          </a:rPr>
+                          <m:t>𝐷</m:t>
+                        </m:r>
+                      </m:e>
+                      <m:sub>
+                        <m:r>
+                          <a:rPr lang="fi-FI" i="1">
+                            <a:latin typeface="Cambria Math" panose="02040503050406030204" pitchFamily="18" charset="0"/>
+                          </a:rPr>
+                          <m:t>𝐾</m:t>
+                        </m:r>
+                      </m:sub>
+                    </m:sSub>
+                    <m:d>
+                      <m:dPr>
+                        <m:ctrlPr>
+                          <a:rPr lang="fi-FI" i="1">
+                            <a:latin typeface="Cambria Math" panose="02040503050406030204" pitchFamily="18" charset="0"/>
+                          </a:rPr>
+                        </m:ctrlPr>
+                      </m:dPr>
+                      <m:e>
+                        <m:sSub>
+                          <m:sSubPr>
+                            <m:ctrlPr>
+                              <a:rPr lang="fi-FI" i="1">
+                                <a:latin typeface="Cambria Math" panose="02040503050406030204" pitchFamily="18" charset="0"/>
+                              </a:rPr>
+                            </m:ctrlPr>
+                          </m:sSubPr>
+                          <m:e>
+                            <m:r>
+                              <a:rPr lang="fi-FI" i="1">
+                                <a:latin typeface="Cambria Math" panose="02040503050406030204" pitchFamily="18" charset="0"/>
+                              </a:rPr>
+                              <m:t>𝐶</m:t>
+                            </m:r>
+                          </m:e>
+                          <m:sub>
+                            <m:r>
+                              <a:rPr lang="fi-FI" i="1">
+                                <a:latin typeface="Cambria Math" panose="02040503050406030204" pitchFamily="18" charset="0"/>
+                              </a:rPr>
+                              <m:t>𝑖</m:t>
+                            </m:r>
+                          </m:sub>
+                        </m:sSub>
+                      </m:e>
+                    </m:d>
+                    <m:r>
+                      <a:rPr lang="fi-FI" b="0" i="1" smtClean="0">
+                        <a:latin typeface="Cambria Math" panose="02040503050406030204" pitchFamily="18" charset="0"/>
+                      </a:rPr>
+                      <m:t>, </m:t>
+                    </m:r>
+                    <m:r>
+                      <a:rPr lang="fi-FI" i="1">
+                        <a:latin typeface="Cambria Math" panose="02040503050406030204" pitchFamily="18" charset="0"/>
+                      </a:rPr>
+                      <m:t>𝑖</m:t>
+                    </m:r>
+                    <m:r>
+                      <a:rPr lang="fi-FI" i="1">
+                        <a:latin typeface="Cambria Math" panose="02040503050406030204" pitchFamily="18" charset="0"/>
+                      </a:rPr>
+                      <m:t>=1,2,…,</m:t>
+                    </m:r>
+                    <m:r>
+                      <a:rPr lang="fi-FI" i="1">
+                        <a:latin typeface="Cambria Math" panose="02040503050406030204" pitchFamily="18" charset="0"/>
+                      </a:rPr>
+                      <m:t>𝑛</m:t>
+                    </m:r>
+                  </m:oMath>
+                </a14:m>
+                <a:endParaRPr lang="fi-FI" dirty="0"/>
+              </a:p>
+            </p:txBody>
+          </p:sp>
+        </mc:Choice>
+        <mc:Fallback xmlns="">
+          <p:sp>
+            <p:nvSpPr>
+              <p:cNvPr id="3" name="Content Placeholder 2">
+                <a:extLst>
+                  <a:ext uri="{FF2B5EF4-FFF2-40B4-BE49-F238E27FC236}">
+                    <a16:creationId xmlns:a16="http://schemas.microsoft.com/office/drawing/2014/main" id="{5230BB5D-30F4-C465-4557-AB23115D420B}"/>
+                  </a:ext>
+                </a:extLst>
+              </p:cNvPr>
+              <p:cNvSpPr>
+                <a:spLocks noGrp="1" noRot="1" noChangeAspect="1" noMove="1" noResize="1" noEditPoints="1" noAdjustHandles="1" noChangeArrowheads="1" noChangeShapeType="1" noTextEdit="1"/>
+              </p:cNvSpPr>
+              <p:nvPr>
+                <p:ph sz="half" idx="1"/>
+              </p:nvPr>
+            </p:nvSpPr>
+            <p:spPr>
+              <a:xfrm>
+                <a:off x="6096000" y="1690688"/>
+                <a:ext cx="5181600" cy="4351338"/>
+              </a:xfrm>
+              <a:blipFill>
+                <a:blip r:embed="rId2"/>
+                <a:stretch>
+                  <a:fillRect l="-353" t="-1541"/>
+                </a:stretch>
+              </a:blipFill>
+            </p:spPr>
+            <p:txBody>
+              <a:bodyPr/>
+              <a:lstStyle/>
+              <a:p>
+                <a:r>
+                  <a:rPr lang="fi-FI">
+                    <a:noFill/>
+                  </a:rPr>
+                  <a:t> </a:t>
+                </a:r>
+              </a:p>
+            </p:txBody>
+          </p:sp>
+        </mc:Fallback>
+      </mc:AlternateContent>
       <p:pic>
         <p:nvPicPr>
           <p:cNvPr id="6" name="Content Placeholder 5">
@@ -4943,13 +5627,13 @@
           </p:nvPr>
         </p:nvPicPr>
         <p:blipFill>
-          <a:blip r:embed="rId2">
+          <a:blip r:embed="rId3">
             <a:extLst>
               <a:ext uri="{28A0092B-C50C-407E-A947-70E740481C1C}">
                 <a14:useLocalDpi xmlns:a14="http://schemas.microsoft.com/office/drawing/2010/main" val="0"/>
               </a:ext>
               <a:ext uri="{96DAC541-7B7A-43D3-8B79-37D633B846F1}">
-                <asvg:svgBlip xmlns:asvg="http://schemas.microsoft.com/office/drawing/2016/SVG/main" r:embed="rId3"/>
+                <asvg:svgBlip xmlns:asvg="http://schemas.microsoft.com/office/drawing/2016/SVG/main" r:embed="rId4"/>
               </a:ext>
             </a:extLst>
           </a:blip>
@@ -4979,7 +5663,7 @@
           <p:nvPr/>
         </p:nvPicPr>
         <p:blipFill>
-          <a:blip r:embed="rId4">
+          <a:blip r:embed="rId5">
             <a:extLst>
               <a:ext uri="{28A0092B-C50C-407E-A947-70E740481C1C}">
                 <a14:useLocalDpi xmlns:a14="http://schemas.microsoft.com/office/drawing/2010/main" val="0"/>
@@ -5014,13 +5698,13 @@
           <p:nvPr/>
         </p:nvPicPr>
         <p:blipFill>
-          <a:blip r:embed="rId5">
+          <a:blip r:embed="rId6">
             <a:extLst>
               <a:ext uri="{28A0092B-C50C-407E-A947-70E740481C1C}">
                 <a14:useLocalDpi xmlns:a14="http://schemas.microsoft.com/office/drawing/2010/main" val="0"/>
               </a:ext>
               <a:ext uri="{96DAC541-7B7A-43D3-8B79-37D633B846F1}">
-                <asvg:svgBlip xmlns:asvg="http://schemas.microsoft.com/office/drawing/2016/SVG/main" r:embed="rId6"/>
+                <asvg:svgBlip xmlns:asvg="http://schemas.microsoft.com/office/drawing/2016/SVG/main" r:embed="rId7"/>
               </a:ext>
             </a:extLst>
           </a:blip>
@@ -5030,7 +5714,7 @@
         <p:spPr>
           <a:xfrm>
             <a:off x="824777" y="3590821"/>
-            <a:ext cx="4229100" cy="1576493"/>
+            <a:ext cx="4229100" cy="1576492"/>
           </a:xfrm>
           <a:prstGeom prst="rect">
             <a:avLst/>
@@ -5052,7 +5736,7 @@
           <p:nvPr/>
         </p:nvPicPr>
         <p:blipFill>
-          <a:blip r:embed="rId7">
+          <a:blip r:embed="rId8">
             <a:extLst>
               <a:ext uri="{28A0092B-C50C-407E-A947-70E740481C1C}">
                 <a14:useLocalDpi xmlns:a14="http://schemas.microsoft.com/office/drawing/2010/main" val="0"/>
@@ -5151,113 +5835,585 @@
           </a:p>
         </p:txBody>
       </p:sp>
-      <p:sp>
-        <p:nvSpPr>
-          <p:cNvPr id="3" name="Content Placeholder 2">
-            <a:extLst>
-              <a:ext uri="{FF2B5EF4-FFF2-40B4-BE49-F238E27FC236}">
-                <a16:creationId xmlns:a16="http://schemas.microsoft.com/office/drawing/2014/main" id="{5230BB5D-30F4-C465-4557-AB23115D420B}"/>
-              </a:ext>
-            </a:extLst>
-          </p:cNvPr>
-          <p:cNvSpPr>
-            <a:spLocks noGrp="1"/>
-          </p:cNvSpPr>
-          <p:nvPr>
-            <p:ph sz="half" idx="1"/>
-          </p:nvPr>
-        </p:nvSpPr>
-        <p:spPr>
-          <a:xfrm>
-            <a:off x="6096000" y="1690688"/>
-            <a:ext cx="5181600" cy="4351338"/>
-          </a:xfrm>
-        </p:spPr>
-        <p:txBody>
-          <a:bodyPr>
-            <a:normAutofit fontScale="70000" lnSpcReduction="20000"/>
-          </a:bodyPr>
-          <a:lstStyle/>
-          <a:p>
-            <a:r>
-              <a:rPr lang="fi-FI" dirty="0"/>
-              <a:t>Salalohkojen ketjutus: jokainen salalohko on riippuvainen kaikista sitä edeltävistä salalohkoista. Ensimmäinen salalohko on riippuvainen alkuarvosta (</a:t>
-            </a:r>
-            <a:r>
-              <a:rPr lang="fi-FI" dirty="0" err="1"/>
-              <a:t>Initialization</a:t>
-            </a:r>
-            <a:r>
-              <a:rPr lang="fi-FI" dirty="0"/>
-              <a:t> </a:t>
-            </a:r>
-            <a:r>
-              <a:rPr lang="fi-FI" dirty="0" err="1"/>
-              <a:t>vector</a:t>
-            </a:r>
-            <a:r>
-              <a:rPr lang="fi-FI" dirty="0"/>
-              <a:t>, IV)</a:t>
-            </a:r>
-          </a:p>
-          <a:p>
-            <a:r>
-              <a:rPr lang="fi-FI" dirty="0"/>
-              <a:t>Ketjutus tapahtuu XOR-operaation avulla</a:t>
-            </a:r>
-          </a:p>
-          <a:p>
-            <a:r>
-              <a:rPr lang="fi-FI" dirty="0"/>
-              <a:t>Vaihtuvan IV:n ansiosta täysin samat selväkieliset tekstit tuottavat täysin erilaiset salatekstit myös saman avaimen alla (lumivyöryefekti)</a:t>
-            </a:r>
-          </a:p>
-          <a:p>
-            <a:r>
-              <a:rPr lang="fi-FI" dirty="0"/>
-              <a:t>IV täytyy generoida huolella. Se ei saa olla ennalta-arvattava, muutoin hyökkääjä voi arvata selkokielisen tekstin sisältöä ja pystyy tarkistamaan arvauksensa oikeellisuuden</a:t>
-            </a:r>
-          </a:p>
-          <a:p>
-            <a:r>
-              <a:rPr lang="fi-FI" dirty="0"/>
-              <a:t>Vaatii </a:t>
-            </a:r>
-            <a:r>
-              <a:rPr lang="fi-FI" dirty="0" err="1"/>
-              <a:t>päddäystä</a:t>
-            </a:r>
-            <a:r>
-              <a:rPr lang="fi-FI" dirty="0"/>
-              <a:t>, joka myöskin voi johtaa tietoturvariskeihin (</a:t>
-            </a:r>
-            <a:r>
-              <a:rPr lang="fi-FI" dirty="0" err="1"/>
-              <a:t>Padding</a:t>
-            </a:r>
-            <a:r>
-              <a:rPr lang="fi-FI" dirty="0"/>
-              <a:t> </a:t>
-            </a:r>
-            <a:r>
-              <a:rPr lang="fi-FI" dirty="0" err="1"/>
-              <a:t>oracle</a:t>
-            </a:r>
-            <a:r>
-              <a:rPr lang="fi-FI" dirty="0"/>
-              <a:t> </a:t>
-            </a:r>
-            <a:r>
-              <a:rPr lang="fi-FI" dirty="0" err="1"/>
-              <a:t>attack</a:t>
-            </a:r>
-            <a:r>
-              <a:rPr lang="fi-FI" dirty="0"/>
-              <a:t>)</a:t>
-            </a:r>
-          </a:p>
-        </p:txBody>
-      </p:sp>
+      <mc:AlternateContent xmlns:mc="http://schemas.openxmlformats.org/markup-compatibility/2006" xmlns:a14="http://schemas.microsoft.com/office/drawing/2010/main">
+        <mc:Choice Requires="a14">
+          <p:sp>
+            <p:nvSpPr>
+              <p:cNvPr id="3" name="Content Placeholder 2">
+                <a:extLst>
+                  <a:ext uri="{FF2B5EF4-FFF2-40B4-BE49-F238E27FC236}">
+                    <a16:creationId xmlns:a16="http://schemas.microsoft.com/office/drawing/2014/main" id="{5230BB5D-30F4-C465-4557-AB23115D420B}"/>
+                  </a:ext>
+                </a:extLst>
+              </p:cNvPr>
+              <p:cNvSpPr>
+                <a:spLocks noGrp="1"/>
+              </p:cNvSpPr>
+              <p:nvPr>
+                <p:ph sz="half" idx="1"/>
+              </p:nvPr>
+            </p:nvSpPr>
+            <p:spPr>
+              <a:xfrm>
+                <a:off x="6096000" y="1690688"/>
+                <a:ext cx="5181600" cy="4351338"/>
+              </a:xfrm>
+            </p:spPr>
+            <p:txBody>
+              <a:bodyPr>
+                <a:normAutofit fontScale="62500" lnSpcReduction="20000"/>
+              </a:bodyPr>
+              <a:lstStyle/>
+              <a:p>
+                <a:r>
+                  <a:rPr lang="fi-FI" dirty="0"/>
+                  <a:t>Salalohkojen ketjutus: jokainen salalohko on riippuvainen kaikista sitä edeltävistä salalohkoista. Ensimmäinen salalohko on riippuvainen alkuarvosta (</a:t>
+                </a:r>
+                <a:r>
+                  <a:rPr lang="fi-FI" dirty="0" err="1"/>
+                  <a:t>Initialization</a:t>
+                </a:r>
+                <a:r>
+                  <a:rPr lang="fi-FI" dirty="0"/>
+                  <a:t> </a:t>
+                </a:r>
+                <a:r>
+                  <a:rPr lang="fi-FI" dirty="0" err="1"/>
+                  <a:t>vector</a:t>
+                </a:r>
+                <a:r>
+                  <a:rPr lang="fi-FI" dirty="0"/>
+                  <a:t>, IV)</a:t>
+                </a:r>
+              </a:p>
+              <a:p>
+                <a:r>
+                  <a:rPr lang="fi-FI" dirty="0"/>
+                  <a:t>Ketjutus tapahtuu XOR-operaation avulla</a:t>
+                </a:r>
+              </a:p>
+              <a:p>
+                <a:r>
+                  <a:rPr lang="fi-FI" dirty="0"/>
+                  <a:t>Vaihtuvan IV:n ansiosta täysin samat selväkieliset tekstit tuottavat täysin erilaiset salatekstit myös saman avaimen alla (lumivyöryefekti)</a:t>
+                </a:r>
+              </a:p>
+              <a:p>
+                <a:r>
+                  <a:rPr lang="fi-FI" dirty="0"/>
+                  <a:t>IV täytyy generoida huolella. Se ei saa olla ennalta-arvattava, muutoin hyökkääjä voi arvata selkokielisen tekstin sisältöä ja pystyy tarkistamaan arvauksensa oikeellisuuden</a:t>
+                </a:r>
+              </a:p>
+              <a:p>
+                <a:r>
+                  <a:rPr lang="fi-FI" dirty="0"/>
+                  <a:t>Vaatii </a:t>
+                </a:r>
+                <a:r>
+                  <a:rPr lang="fi-FI" dirty="0" err="1"/>
+                  <a:t>päddäystä</a:t>
+                </a:r>
+                <a:r>
+                  <a:rPr lang="fi-FI" dirty="0"/>
+                  <a:t>, joka myöskin voi johtaa tietoturvariskeihin (</a:t>
+                </a:r>
+                <a:r>
+                  <a:rPr lang="fi-FI" dirty="0" err="1"/>
+                  <a:t>Padding</a:t>
+                </a:r>
+                <a:r>
+                  <a:rPr lang="fi-FI" dirty="0"/>
+                  <a:t> </a:t>
+                </a:r>
+                <a:r>
+                  <a:rPr lang="fi-FI" dirty="0" err="1"/>
+                  <a:t>oracle</a:t>
+                </a:r>
+                <a:r>
+                  <a:rPr lang="fi-FI" dirty="0"/>
+                  <a:t> </a:t>
+                </a:r>
+                <a:r>
+                  <a:rPr lang="fi-FI" dirty="0" err="1"/>
+                  <a:t>attack</a:t>
+                </a:r>
+                <a:r>
+                  <a:rPr lang="fi-FI" dirty="0"/>
+                  <a:t>)</a:t>
+                </a:r>
+              </a:p>
+              <a:p>
+                <a14:m>
+                  <m:oMath xmlns:m="http://schemas.openxmlformats.org/officeDocument/2006/math">
+                    <m:sSub>
+                      <m:sSubPr>
+                        <m:ctrlPr>
+                          <a:rPr lang="fi-FI" b="0" i="1" smtClean="0">
+                            <a:latin typeface="Cambria Math" panose="02040503050406030204" pitchFamily="18" charset="0"/>
+                          </a:rPr>
+                        </m:ctrlPr>
+                      </m:sSubPr>
+                      <m:e>
+                        <m:r>
+                          <a:rPr lang="fi-FI" i="1">
+                            <a:latin typeface="Cambria Math" panose="02040503050406030204" pitchFamily="18" charset="0"/>
+                          </a:rPr>
+                          <m:t>𝐶</m:t>
+                        </m:r>
+                      </m:e>
+                      <m:sub>
+                        <m:r>
+                          <a:rPr lang="fi-FI" i="1">
+                            <a:latin typeface="Cambria Math" panose="02040503050406030204" pitchFamily="18" charset="0"/>
+                          </a:rPr>
+                          <m:t>𝑖</m:t>
+                        </m:r>
+                      </m:sub>
+                    </m:sSub>
+                    <m:r>
+                      <a:rPr lang="fi-FI" i="1">
+                        <a:latin typeface="Cambria Math" panose="02040503050406030204" pitchFamily="18" charset="0"/>
+                      </a:rPr>
+                      <m:t>= </m:t>
+                    </m:r>
+                    <m:sSub>
+                      <m:sSubPr>
+                        <m:ctrlPr>
+                          <a:rPr lang="fi-FI" b="0" i="1" smtClean="0">
+                            <a:latin typeface="Cambria Math" panose="02040503050406030204" pitchFamily="18" charset="0"/>
+                          </a:rPr>
+                        </m:ctrlPr>
+                      </m:sSubPr>
+                      <m:e>
+                        <m:r>
+                          <a:rPr lang="fi-FI" i="1">
+                            <a:latin typeface="Cambria Math" panose="02040503050406030204" pitchFamily="18" charset="0"/>
+                          </a:rPr>
+                          <m:t>𝐸</m:t>
+                        </m:r>
+                      </m:e>
+                      <m:sub>
+                        <m:r>
+                          <a:rPr lang="fi-FI" b="0" i="1" smtClean="0">
+                            <a:latin typeface="Cambria Math" panose="02040503050406030204" pitchFamily="18" charset="0"/>
+                          </a:rPr>
+                          <m:t>𝐾</m:t>
+                        </m:r>
+                      </m:sub>
+                    </m:sSub>
+                    <m:d>
+                      <m:dPr>
+                        <m:ctrlPr>
+                          <a:rPr lang="fi-FI" b="0" i="1" smtClean="0">
+                            <a:latin typeface="Cambria Math" panose="02040503050406030204" pitchFamily="18" charset="0"/>
+                          </a:rPr>
+                        </m:ctrlPr>
+                      </m:dPr>
+                      <m:e>
+                        <m:sSub>
+                          <m:sSubPr>
+                            <m:ctrlPr>
+                              <a:rPr lang="fi-FI" b="0" i="1" smtClean="0">
+                                <a:latin typeface="Cambria Math" panose="02040503050406030204" pitchFamily="18" charset="0"/>
+                              </a:rPr>
+                            </m:ctrlPr>
+                          </m:sSubPr>
+                          <m:e>
+                            <m:r>
+                              <a:rPr lang="fi-FI" i="1">
+                                <a:latin typeface="Cambria Math" panose="02040503050406030204" pitchFamily="18" charset="0"/>
+                              </a:rPr>
+                              <m:t>𝐶</m:t>
+                            </m:r>
+                          </m:e>
+                          <m:sub>
+                            <m:r>
+                              <a:rPr lang="fi-FI" i="1">
+                                <a:latin typeface="Cambria Math" panose="02040503050406030204" pitchFamily="18" charset="0"/>
+                              </a:rPr>
+                              <m:t>𝑖</m:t>
+                            </m:r>
+                            <m:r>
+                              <a:rPr lang="fi-FI" b="0" i="1" smtClean="0">
+                                <a:latin typeface="Cambria Math" panose="02040503050406030204" pitchFamily="18" charset="0"/>
+                              </a:rPr>
+                              <m:t>−1</m:t>
+                            </m:r>
+                          </m:sub>
+                        </m:sSub>
+                        <m:r>
+                          <a:rPr lang="fi-FI" i="1" smtClean="0">
+                            <a:latin typeface="Cambria Math" panose="02040503050406030204" pitchFamily="18" charset="0"/>
+                          </a:rPr>
+                          <m:t>⊕</m:t>
+                        </m:r>
+                        <m:sSub>
+                          <m:sSubPr>
+                            <m:ctrlPr>
+                              <a:rPr lang="fi-FI" b="0" i="1" smtClean="0">
+                                <a:latin typeface="Cambria Math" panose="02040503050406030204" pitchFamily="18" charset="0"/>
+                              </a:rPr>
+                            </m:ctrlPr>
+                          </m:sSubPr>
+                          <m:e>
+                            <m:r>
+                              <a:rPr lang="fi-FI" i="1">
+                                <a:latin typeface="Cambria Math" panose="02040503050406030204" pitchFamily="18" charset="0"/>
+                              </a:rPr>
+                              <m:t>𝑃</m:t>
+                            </m:r>
+                          </m:e>
+                          <m:sub>
+                            <m:r>
+                              <a:rPr lang="fi-FI" i="1">
+                                <a:latin typeface="Cambria Math" panose="02040503050406030204" pitchFamily="18" charset="0"/>
+                              </a:rPr>
+                              <m:t>𝑖</m:t>
+                            </m:r>
+                          </m:sub>
+                        </m:sSub>
+                      </m:e>
+                    </m:d>
+                    <m:r>
+                      <a:rPr lang="fi-FI" b="0" i="1" smtClean="0">
+                        <a:latin typeface="Cambria Math" panose="02040503050406030204" pitchFamily="18" charset="0"/>
+                      </a:rPr>
+                      <m:t>, </m:t>
+                    </m:r>
+                    <m:r>
+                      <a:rPr lang="fi-FI" b="0" i="1" smtClean="0">
+                        <a:latin typeface="Cambria Math" panose="02040503050406030204" pitchFamily="18" charset="0"/>
+                      </a:rPr>
+                      <m:t>𝑖</m:t>
+                    </m:r>
+                    <m:r>
+                      <a:rPr lang="fi-FI" b="0" i="1" smtClean="0">
+                        <a:latin typeface="Cambria Math" panose="02040503050406030204" pitchFamily="18" charset="0"/>
+                      </a:rPr>
+                      <m:t>=1, 2,…,</m:t>
+                    </m:r>
+                    <m:r>
+                      <a:rPr lang="fi-FI" b="0" i="1" smtClean="0">
+                        <a:latin typeface="Cambria Math" panose="02040503050406030204" pitchFamily="18" charset="0"/>
+                      </a:rPr>
+                      <m:t>𝑛</m:t>
+                    </m:r>
+                    <m:r>
+                      <a:rPr lang="fi-FI" b="0" i="1" smtClean="0">
+                        <a:latin typeface="Cambria Math" panose="02040503050406030204" pitchFamily="18" charset="0"/>
+                      </a:rPr>
+                      <m:t>, </m:t>
+                    </m:r>
+                    <m:sSub>
+                      <m:sSubPr>
+                        <m:ctrlPr>
+                          <a:rPr lang="fi-FI" b="0" i="1" smtClean="0">
+                            <a:latin typeface="Cambria Math" panose="02040503050406030204" pitchFamily="18" charset="0"/>
+                          </a:rPr>
+                        </m:ctrlPr>
+                      </m:sSubPr>
+                      <m:e>
+                        <m:r>
+                          <a:rPr lang="fi-FI" b="0" i="1" smtClean="0">
+                            <a:latin typeface="Cambria Math" panose="02040503050406030204" pitchFamily="18" charset="0"/>
+                          </a:rPr>
+                          <m:t>𝐶</m:t>
+                        </m:r>
+                      </m:e>
+                      <m:sub>
+                        <m:r>
+                          <a:rPr lang="fi-FI" b="0" i="1" smtClean="0">
+                            <a:latin typeface="Cambria Math" panose="02040503050406030204" pitchFamily="18" charset="0"/>
+                          </a:rPr>
+                          <m:t>0</m:t>
+                        </m:r>
+                      </m:sub>
+                    </m:sSub>
+                    <m:r>
+                      <a:rPr lang="fi-FI" b="0" i="1" smtClean="0">
+                        <a:latin typeface="Cambria Math" panose="02040503050406030204" pitchFamily="18" charset="0"/>
+                      </a:rPr>
+                      <m:t>=</m:t>
+                    </m:r>
+                    <m:r>
+                      <a:rPr lang="fi-FI" b="0" i="1" smtClean="0">
+                        <a:latin typeface="Cambria Math" panose="02040503050406030204" pitchFamily="18" charset="0"/>
+                      </a:rPr>
+                      <m:t>𝐼𝑉</m:t>
+                    </m:r>
+                  </m:oMath>
+                </a14:m>
+                <a:endParaRPr lang="fi-FI" b="0" i="1" dirty="0">
+                  <a:latin typeface="Cambria Math" panose="02040503050406030204" pitchFamily="18" charset="0"/>
+                </a:endParaRPr>
+              </a:p>
+              <a:p>
+                <a14:m>
+                  <m:oMath xmlns:m="http://schemas.openxmlformats.org/officeDocument/2006/math">
+                    <m:sSub>
+                      <m:sSubPr>
+                        <m:ctrlPr>
+                          <a:rPr lang="fi-FI" b="0" i="1" smtClean="0">
+                            <a:latin typeface="Cambria Math" panose="02040503050406030204" pitchFamily="18" charset="0"/>
+                          </a:rPr>
+                        </m:ctrlPr>
+                      </m:sSubPr>
+                      <m:e>
+                        <m:r>
+                          <a:rPr lang="fi-FI" b="0" i="1" smtClean="0">
+                            <a:latin typeface="Cambria Math" panose="02040503050406030204" pitchFamily="18" charset="0"/>
+                          </a:rPr>
+                          <m:t>𝑃</m:t>
+                        </m:r>
+                      </m:e>
+                      <m:sub>
+                        <m:r>
+                          <a:rPr lang="fi-FI" b="0" i="1" smtClean="0">
+                            <a:latin typeface="Cambria Math" panose="02040503050406030204" pitchFamily="18" charset="0"/>
+                          </a:rPr>
+                          <m:t>𝑖</m:t>
+                        </m:r>
+                      </m:sub>
+                    </m:sSub>
+                    <m:r>
+                      <a:rPr lang="fi-FI" b="0" i="1" smtClean="0">
+                        <a:latin typeface="Cambria Math" panose="02040503050406030204" pitchFamily="18" charset="0"/>
+                      </a:rPr>
+                      <m:t>=</m:t>
+                    </m:r>
+                    <m:sSub>
+                      <m:sSubPr>
+                        <m:ctrlPr>
+                          <a:rPr lang="fi-FI" b="0" i="1" smtClean="0">
+                            <a:latin typeface="Cambria Math" panose="02040503050406030204" pitchFamily="18" charset="0"/>
+                          </a:rPr>
+                        </m:ctrlPr>
+                      </m:sSubPr>
+                      <m:e>
+                        <m:r>
+                          <a:rPr lang="fi-FI" b="0" i="1" smtClean="0">
+                            <a:latin typeface="Cambria Math" panose="02040503050406030204" pitchFamily="18" charset="0"/>
+                          </a:rPr>
+                          <m:t>𝐷</m:t>
+                        </m:r>
+                      </m:e>
+                      <m:sub>
+                        <m:r>
+                          <a:rPr lang="fi-FI" b="0" i="1" smtClean="0">
+                            <a:latin typeface="Cambria Math" panose="02040503050406030204" pitchFamily="18" charset="0"/>
+                          </a:rPr>
+                          <m:t>𝐾</m:t>
+                        </m:r>
+                      </m:sub>
+                    </m:sSub>
+                    <m:d>
+                      <m:dPr>
+                        <m:ctrlPr>
+                          <a:rPr lang="fi-FI" b="0" i="1" smtClean="0">
+                            <a:latin typeface="Cambria Math" panose="02040503050406030204" pitchFamily="18" charset="0"/>
+                          </a:rPr>
+                        </m:ctrlPr>
+                      </m:dPr>
+                      <m:e>
+                        <m:sSub>
+                          <m:sSubPr>
+                            <m:ctrlPr>
+                              <a:rPr lang="fi-FI" b="0" i="1" smtClean="0">
+                                <a:latin typeface="Cambria Math" panose="02040503050406030204" pitchFamily="18" charset="0"/>
+                              </a:rPr>
+                            </m:ctrlPr>
+                          </m:sSubPr>
+                          <m:e>
+                            <m:r>
+                              <a:rPr lang="fi-FI" b="0" i="1" smtClean="0">
+                                <a:latin typeface="Cambria Math" panose="02040503050406030204" pitchFamily="18" charset="0"/>
+                              </a:rPr>
+                              <m:t>𝐶</m:t>
+                            </m:r>
+                          </m:e>
+                          <m:sub>
+                            <m:r>
+                              <a:rPr lang="fi-FI" b="0" i="1" smtClean="0">
+                                <a:latin typeface="Cambria Math" panose="02040503050406030204" pitchFamily="18" charset="0"/>
+                              </a:rPr>
+                              <m:t>𝑖</m:t>
+                            </m:r>
+                          </m:sub>
+                        </m:sSub>
+                      </m:e>
+                    </m:d>
+                    <m:r>
+                      <a:rPr lang="fi-FI" b="0" i="1" smtClean="0">
+                        <a:latin typeface="Cambria Math" panose="02040503050406030204" pitchFamily="18" charset="0"/>
+                        <a:ea typeface="Cambria Math" panose="02040503050406030204" pitchFamily="18" charset="0"/>
+                      </a:rPr>
+                      <m:t>⊕</m:t>
+                    </m:r>
+                    <m:sSub>
+                      <m:sSubPr>
+                        <m:ctrlPr>
+                          <a:rPr lang="fi-FI" b="0" i="1" smtClean="0">
+                            <a:latin typeface="Cambria Math" panose="02040503050406030204" pitchFamily="18" charset="0"/>
+                            <a:ea typeface="Cambria Math" panose="02040503050406030204" pitchFamily="18" charset="0"/>
+                          </a:rPr>
+                        </m:ctrlPr>
+                      </m:sSubPr>
+                      <m:e>
+                        <m:r>
+                          <a:rPr lang="fi-FI" b="0" i="1" smtClean="0">
+                            <a:latin typeface="Cambria Math" panose="02040503050406030204" pitchFamily="18" charset="0"/>
+                            <a:ea typeface="Cambria Math" panose="02040503050406030204" pitchFamily="18" charset="0"/>
+                          </a:rPr>
+                          <m:t>𝐶</m:t>
+                        </m:r>
+                      </m:e>
+                      <m:sub>
+                        <m:r>
+                          <a:rPr lang="fi-FI" b="0" i="1" smtClean="0">
+                            <a:latin typeface="Cambria Math" panose="02040503050406030204" pitchFamily="18" charset="0"/>
+                            <a:ea typeface="Cambria Math" panose="02040503050406030204" pitchFamily="18" charset="0"/>
+                          </a:rPr>
+                          <m:t>𝑖</m:t>
+                        </m:r>
+                        <m:r>
+                          <a:rPr lang="fi-FI" b="0" i="1" smtClean="0">
+                            <a:latin typeface="Cambria Math" panose="02040503050406030204" pitchFamily="18" charset="0"/>
+                            <a:ea typeface="Cambria Math" panose="02040503050406030204" pitchFamily="18" charset="0"/>
+                          </a:rPr>
+                          <m:t>−1</m:t>
+                        </m:r>
+                      </m:sub>
+                    </m:sSub>
+                    <m:r>
+                      <a:rPr lang="fi-FI" b="0" i="1" smtClean="0">
+                        <a:latin typeface="Cambria Math" panose="02040503050406030204" pitchFamily="18" charset="0"/>
+                        <a:ea typeface="Cambria Math" panose="02040503050406030204" pitchFamily="18" charset="0"/>
+                      </a:rPr>
+                      <m:t>, </m:t>
+                    </m:r>
+                    <m:r>
+                      <a:rPr lang="fi-FI" b="0" i="1" smtClean="0">
+                        <a:latin typeface="Cambria Math" panose="02040503050406030204" pitchFamily="18" charset="0"/>
+                        <a:ea typeface="Cambria Math" panose="02040503050406030204" pitchFamily="18" charset="0"/>
+                      </a:rPr>
+                      <m:t>𝑖</m:t>
+                    </m:r>
+                    <m:r>
+                      <a:rPr lang="fi-FI" b="0" i="1" smtClean="0">
+                        <a:latin typeface="Cambria Math" panose="02040503050406030204" pitchFamily="18" charset="0"/>
+                        <a:ea typeface="Cambria Math" panose="02040503050406030204" pitchFamily="18" charset="0"/>
+                      </a:rPr>
+                      <m:t>=1, 2, …, </m:t>
+                    </m:r>
+                    <m:r>
+                      <a:rPr lang="fi-FI" b="0" i="1" smtClean="0">
+                        <a:latin typeface="Cambria Math" panose="02040503050406030204" pitchFamily="18" charset="0"/>
+                        <a:ea typeface="Cambria Math" panose="02040503050406030204" pitchFamily="18" charset="0"/>
+                      </a:rPr>
+                      <m:t>𝑛</m:t>
+                    </m:r>
+                    <m:r>
+                      <a:rPr lang="fi-FI" b="0" i="1" smtClean="0">
+                        <a:latin typeface="Cambria Math" panose="02040503050406030204" pitchFamily="18" charset="0"/>
+                        <a:ea typeface="Cambria Math" panose="02040503050406030204" pitchFamily="18" charset="0"/>
+                      </a:rPr>
+                      <m:t>, </m:t>
+                    </m:r>
+                    <m:sSub>
+                      <m:sSubPr>
+                        <m:ctrlPr>
+                          <a:rPr lang="fi-FI" b="0" i="1" smtClean="0">
+                            <a:latin typeface="Cambria Math" panose="02040503050406030204" pitchFamily="18" charset="0"/>
+                            <a:ea typeface="Cambria Math" panose="02040503050406030204" pitchFamily="18" charset="0"/>
+                          </a:rPr>
+                        </m:ctrlPr>
+                      </m:sSubPr>
+                      <m:e>
+                        <m:r>
+                          <a:rPr lang="fi-FI" b="0" i="1" smtClean="0">
+                            <a:latin typeface="Cambria Math" panose="02040503050406030204" pitchFamily="18" charset="0"/>
+                            <a:ea typeface="Cambria Math" panose="02040503050406030204" pitchFamily="18" charset="0"/>
+                          </a:rPr>
+                          <m:t>𝐶</m:t>
+                        </m:r>
+                      </m:e>
+                      <m:sub>
+                        <m:r>
+                          <a:rPr lang="fi-FI" b="0" i="1" smtClean="0">
+                            <a:latin typeface="Cambria Math" panose="02040503050406030204" pitchFamily="18" charset="0"/>
+                            <a:ea typeface="Cambria Math" panose="02040503050406030204" pitchFamily="18" charset="0"/>
+                          </a:rPr>
+                          <m:t>0</m:t>
+                        </m:r>
+                      </m:sub>
+                    </m:sSub>
+                    <m:r>
+                      <a:rPr lang="fi-FI" b="0" i="1" smtClean="0">
+                        <a:latin typeface="Cambria Math" panose="02040503050406030204" pitchFamily="18" charset="0"/>
+                        <a:ea typeface="Cambria Math" panose="02040503050406030204" pitchFamily="18" charset="0"/>
+                      </a:rPr>
+                      <m:t>=</m:t>
+                    </m:r>
+                    <m:r>
+                      <a:rPr lang="fi-FI" b="0" i="1" smtClean="0">
+                        <a:latin typeface="Cambria Math" panose="02040503050406030204" pitchFamily="18" charset="0"/>
+                        <a:ea typeface="Cambria Math" panose="02040503050406030204" pitchFamily="18" charset="0"/>
+                      </a:rPr>
+                      <m:t>𝐼𝑉</m:t>
+                    </m:r>
+                  </m:oMath>
+                </a14:m>
+                <a:endParaRPr lang="fi-FI" b="0" i="1" dirty="0">
+                  <a:latin typeface="Cambria Math" panose="02040503050406030204" pitchFamily="18" charset="0"/>
+                </a:endParaRPr>
+              </a:p>
+            </p:txBody>
+          </p:sp>
+        </mc:Choice>
+        <mc:Fallback xmlns="">
+          <p:sp>
+            <p:nvSpPr>
+              <p:cNvPr id="3" name="Content Placeholder 2">
+                <a:extLst>
+                  <a:ext uri="{FF2B5EF4-FFF2-40B4-BE49-F238E27FC236}">
+                    <a16:creationId xmlns:a16="http://schemas.microsoft.com/office/drawing/2014/main" id="{5230BB5D-30F4-C465-4557-AB23115D420B}"/>
+                  </a:ext>
+                </a:extLst>
+              </p:cNvPr>
+              <p:cNvSpPr>
+                <a:spLocks noGrp="1" noRot="1" noChangeAspect="1" noMove="1" noResize="1" noEditPoints="1" noAdjustHandles="1" noChangeArrowheads="1" noChangeShapeType="1" noTextEdit="1"/>
+              </p:cNvSpPr>
+              <p:nvPr>
+                <p:ph sz="half" idx="1"/>
+              </p:nvPr>
+            </p:nvSpPr>
+            <p:spPr>
+              <a:xfrm>
+                <a:off x="6096000" y="1690688"/>
+                <a:ext cx="5181600" cy="4351338"/>
+              </a:xfrm>
+              <a:blipFill>
+                <a:blip r:embed="rId2"/>
+                <a:stretch>
+                  <a:fillRect l="-706" t="-2241" r="-941"/>
+                </a:stretch>
+              </a:blipFill>
+            </p:spPr>
+            <p:txBody>
+              <a:bodyPr/>
+              <a:lstStyle/>
+              <a:p>
+                <a:r>
+                  <a:rPr lang="fi-FI">
+                    <a:noFill/>
+                  </a:rPr>
+                  <a:t> </a:t>
+                </a:r>
+              </a:p>
+            </p:txBody>
+          </p:sp>
+        </mc:Fallback>
+      </mc:AlternateContent>
       <p:pic>
         <p:nvPicPr>
           <p:cNvPr id="6" name="Content Placeholder 5">
@@ -5275,13 +6431,13 @@
           </p:nvPr>
         </p:nvPicPr>
         <p:blipFill>
-          <a:blip r:embed="rId2">
+          <a:blip r:embed="rId3">
             <a:extLst>
               <a:ext uri="{28A0092B-C50C-407E-A947-70E740481C1C}">
                 <a14:useLocalDpi xmlns:a14="http://schemas.microsoft.com/office/drawing/2010/main" val="0"/>
               </a:ext>
               <a:ext uri="{96DAC541-7B7A-43D3-8B79-37D633B846F1}">
-                <asvg:svgBlip xmlns:asvg="http://schemas.microsoft.com/office/drawing/2016/SVG/main" r:embed="rId3"/>
+                <asvg:svgBlip xmlns:asvg="http://schemas.microsoft.com/office/drawing/2016/SVG/main" r:embed="rId4"/>
               </a:ext>
             </a:extLst>
           </a:blip>
@@ -5310,13 +6466,13 @@
           <p:nvPr/>
         </p:nvPicPr>
         <p:blipFill>
-          <a:blip r:embed="rId4">
+          <a:blip r:embed="rId5">
             <a:extLst>
               <a:ext uri="{28A0092B-C50C-407E-A947-70E740481C1C}">
                 <a14:useLocalDpi xmlns:a14="http://schemas.microsoft.com/office/drawing/2010/main" val="0"/>
               </a:ext>
               <a:ext uri="{96DAC541-7B7A-43D3-8B79-37D633B846F1}">
-                <asvg:svgBlip xmlns:asvg="http://schemas.microsoft.com/office/drawing/2016/SVG/main" r:embed="rId5"/>
+                <asvg:svgBlip xmlns:asvg="http://schemas.microsoft.com/office/drawing/2016/SVG/main" r:embed="rId6"/>
               </a:ext>
             </a:extLst>
           </a:blip>
@@ -5404,140 +6560,759 @@
           </a:p>
         </p:txBody>
       </p:sp>
-      <p:sp>
-        <p:nvSpPr>
-          <p:cNvPr id="3" name="Content Placeholder 2">
-            <a:extLst>
-              <a:ext uri="{FF2B5EF4-FFF2-40B4-BE49-F238E27FC236}">
-                <a16:creationId xmlns:a16="http://schemas.microsoft.com/office/drawing/2014/main" id="{5230BB5D-30F4-C465-4557-AB23115D420B}"/>
-              </a:ext>
-            </a:extLst>
-          </p:cNvPr>
-          <p:cNvSpPr>
-            <a:spLocks noGrp="1"/>
-          </p:cNvSpPr>
-          <p:nvPr>
-            <p:ph sz="half" idx="1"/>
-          </p:nvPr>
-        </p:nvSpPr>
-        <p:spPr>
-          <a:xfrm>
-            <a:off x="6096000" y="1690688"/>
-            <a:ext cx="5181600" cy="4351338"/>
-          </a:xfrm>
-        </p:spPr>
-        <p:txBody>
-          <a:bodyPr>
-            <a:normAutofit fontScale="55000" lnSpcReduction="20000"/>
-          </a:bodyPr>
-          <a:lstStyle/>
-          <a:p>
-            <a:r>
-              <a:rPr lang="fi-FI" dirty="0"/>
-              <a:t>Tuotetaan avainketju salaamalla kertakäyttöluvun (</a:t>
-            </a:r>
-            <a:r>
-              <a:rPr lang="fi-FI" dirty="0" err="1"/>
-              <a:t>nonce</a:t>
-            </a:r>
-            <a:r>
-              <a:rPr lang="fi-FI" dirty="0"/>
-              <a:t>) ja nousevan laskurin </a:t>
-            </a:r>
-            <a:r>
-              <a:rPr lang="fi-FI" dirty="0" err="1"/>
-              <a:t>konkatenaatio</a:t>
-            </a:r>
-            <a:r>
-              <a:rPr lang="fi-FI" dirty="0"/>
-              <a:t> toistuvasti </a:t>
-            </a:r>
-            <a:r>
-              <a:rPr lang="fi-FI" dirty="0" err="1"/>
-              <a:t>lohkosalaimella</a:t>
-            </a:r>
-            <a:endParaRPr lang="fi-FI" dirty="0"/>
-          </a:p>
-          <a:p>
-            <a:r>
-              <a:rPr lang="fi-FI" dirty="0"/>
-              <a:t>Salalohko saadaan </a:t>
-            </a:r>
-            <a:r>
-              <a:rPr lang="fi-FI" dirty="0" err="1"/>
-              <a:t>XORaamalla</a:t>
-            </a:r>
-            <a:r>
-              <a:rPr lang="fi-FI" dirty="0"/>
-              <a:t> selväkielinen lohko vastaavalla avainjonon lohkolla</a:t>
-            </a:r>
-          </a:p>
-          <a:p>
-            <a:r>
-              <a:rPr lang="fi-FI" dirty="0"/>
-              <a:t>Uusi </a:t>
-            </a:r>
-            <a:r>
-              <a:rPr lang="fi-FI" dirty="0" err="1"/>
-              <a:t>nonce</a:t>
-            </a:r>
-            <a:r>
-              <a:rPr lang="fi-FI" dirty="0"/>
-              <a:t> jokaiselle viestille, laskuri kasvaa lohkojen mukana. </a:t>
-            </a:r>
-          </a:p>
-          <a:p>
-            <a:pPr lvl="1"/>
-            <a:r>
-              <a:rPr lang="fi-FI" dirty="0"/>
-              <a:t>Huolehdittava, että </a:t>
-            </a:r>
-            <a:r>
-              <a:rPr lang="fi-FI" dirty="0" err="1"/>
-              <a:t>noncet</a:t>
-            </a:r>
-            <a:r>
-              <a:rPr lang="fi-FI" dirty="0"/>
-              <a:t> generoidaan siten, ettei saman avaimen alla käytetä samaa </a:t>
-            </a:r>
-            <a:r>
-              <a:rPr lang="fi-FI" dirty="0" err="1"/>
-              <a:t>noncea</a:t>
-            </a:r>
-            <a:r>
-              <a:rPr lang="fi-FI" dirty="0"/>
-              <a:t> useammin kuin kerran</a:t>
-            </a:r>
-          </a:p>
-          <a:p>
-            <a:pPr lvl="1"/>
-            <a:r>
-              <a:rPr lang="fi-FI" dirty="0"/>
-              <a:t>Huolehdittava myös, ettei laskuri kiepsahda ympäri ja ala alusta saman viestin sisällä</a:t>
-            </a:r>
-          </a:p>
-          <a:p>
-            <a:r>
-              <a:rPr lang="fi-FI" dirty="0"/>
-              <a:t>Lohkot käsitellään erikseen, joten rinnakkaislaskenta sekä salauksessa että salauksen purkamisessa mahdollista. Myös avainketju voidaan laskea etukäteen jos laskurin toiminta ja </a:t>
-            </a:r>
-            <a:r>
-              <a:rPr lang="fi-FI" dirty="0" err="1"/>
-              <a:t>nonce</a:t>
-            </a:r>
-            <a:r>
-              <a:rPr lang="fi-FI" dirty="0"/>
-              <a:t> ovat tiedossa</a:t>
-            </a:r>
-          </a:p>
-          <a:p>
-            <a:r>
-              <a:rPr lang="fi-FI" dirty="0"/>
-              <a:t>Tarvitaan ainoastaan lohkosalaimen salaussuunta. XOR-operaation ominaisuuden ansiosta purku tapahtuu käyttämällä samaa avainketjua mutta vaihtamalla selvälohkon ja salalohkon paikkaa</a:t>
-            </a:r>
-          </a:p>
-        </p:txBody>
-      </p:sp>
+      <mc:AlternateContent xmlns:mc="http://schemas.openxmlformats.org/markup-compatibility/2006" xmlns:a14="http://schemas.microsoft.com/office/drawing/2010/main">
+        <mc:Choice Requires="a14">
+          <p:sp>
+            <p:nvSpPr>
+              <p:cNvPr id="3" name="Content Placeholder 2">
+                <a:extLst>
+                  <a:ext uri="{FF2B5EF4-FFF2-40B4-BE49-F238E27FC236}">
+                    <a16:creationId xmlns:a16="http://schemas.microsoft.com/office/drawing/2014/main" id="{5230BB5D-30F4-C465-4557-AB23115D420B}"/>
+                  </a:ext>
+                </a:extLst>
+              </p:cNvPr>
+              <p:cNvSpPr>
+                <a:spLocks noGrp="1"/>
+              </p:cNvSpPr>
+              <p:nvPr>
+                <p:ph sz="half" idx="1"/>
+              </p:nvPr>
+            </p:nvSpPr>
+            <p:spPr>
+              <a:xfrm>
+                <a:off x="6096000" y="1690688"/>
+                <a:ext cx="5181600" cy="4351338"/>
+              </a:xfrm>
+            </p:spPr>
+            <p:txBody>
+              <a:bodyPr>
+                <a:normAutofit fontScale="55000" lnSpcReduction="20000"/>
+              </a:bodyPr>
+              <a:lstStyle/>
+              <a:p>
+                <a:r>
+                  <a:rPr lang="fi-FI" dirty="0"/>
+                  <a:t>Tuotetaan avainketju salaamalla kertakäyttöluvun (</a:t>
+                </a:r>
+                <a:r>
+                  <a:rPr lang="fi-FI" dirty="0" err="1"/>
+                  <a:t>nonce</a:t>
+                </a:r>
+                <a:r>
+                  <a:rPr lang="fi-FI" dirty="0"/>
+                  <a:t>) ja nousevan laskurin </a:t>
+                </a:r>
+                <a:r>
+                  <a:rPr lang="fi-FI" dirty="0" err="1"/>
+                  <a:t>konkatenaatio</a:t>
+                </a:r>
+                <a:r>
+                  <a:rPr lang="fi-FI" dirty="0"/>
+                  <a:t> toistuvasti </a:t>
+                </a:r>
+                <a:r>
+                  <a:rPr lang="fi-FI" dirty="0" err="1"/>
+                  <a:t>lohkosalaimella</a:t>
+                </a:r>
+                <a:endParaRPr lang="fi-FI" dirty="0"/>
+              </a:p>
+              <a:p>
+                <a:r>
+                  <a:rPr lang="fi-FI" dirty="0"/>
+                  <a:t>Salalohko saadaan </a:t>
+                </a:r>
+                <a:r>
+                  <a:rPr lang="fi-FI" dirty="0" err="1"/>
+                  <a:t>XORaamalla</a:t>
+                </a:r>
+                <a:r>
+                  <a:rPr lang="fi-FI" dirty="0"/>
+                  <a:t> selväkielinen lohko vastaavalla avainjonon lohkolla</a:t>
+                </a:r>
+              </a:p>
+              <a:p>
+                <a:r>
+                  <a:rPr lang="fi-FI" dirty="0"/>
+                  <a:t>Uusi </a:t>
+                </a:r>
+                <a:r>
+                  <a:rPr lang="fi-FI" dirty="0" err="1"/>
+                  <a:t>nonce</a:t>
+                </a:r>
+                <a:r>
+                  <a:rPr lang="fi-FI" dirty="0"/>
+                  <a:t> jokaiselle viestille, laskuri kasvaa lohkojen mukana. </a:t>
+                </a:r>
+              </a:p>
+              <a:p>
+                <a:pPr lvl="1"/>
+                <a:r>
+                  <a:rPr lang="fi-FI" dirty="0"/>
+                  <a:t>Huolehdittava, että </a:t>
+                </a:r>
+                <a:r>
+                  <a:rPr lang="fi-FI" dirty="0" err="1"/>
+                  <a:t>noncet</a:t>
+                </a:r>
+                <a:r>
+                  <a:rPr lang="fi-FI" dirty="0"/>
+                  <a:t> generoidaan siten, ettei saman avaimen alla käytetä samaa </a:t>
+                </a:r>
+                <a:r>
+                  <a:rPr lang="fi-FI" dirty="0" err="1"/>
+                  <a:t>noncea</a:t>
+                </a:r>
+                <a:r>
+                  <a:rPr lang="fi-FI" dirty="0"/>
+                  <a:t> useammin kuin kerran</a:t>
+                </a:r>
+              </a:p>
+              <a:p>
+                <a:pPr lvl="1"/>
+                <a:r>
+                  <a:rPr lang="fi-FI" dirty="0"/>
+                  <a:t>Huolehdittava myös, ettei laskuri kiepsahda ympäri ja ala alusta saman viestin sisällä</a:t>
+                </a:r>
+              </a:p>
+              <a:p>
+                <a:r>
+                  <a:rPr lang="fi-FI" dirty="0"/>
+                  <a:t>Lohkot käsitellään erikseen, joten rinnakkaislaskenta sekä salauksessa että salauksen purkamisessa mahdollista. Myös avainketju voidaan laskea etukäteen jos laskurin toiminta ja </a:t>
+                </a:r>
+                <a:r>
+                  <a:rPr lang="fi-FI" dirty="0" err="1"/>
+                  <a:t>nonce</a:t>
+                </a:r>
+                <a:r>
+                  <a:rPr lang="fi-FI" dirty="0"/>
+                  <a:t> ovat tiedossa</a:t>
+                </a:r>
+              </a:p>
+              <a:p>
+                <a14:m>
+                  <m:oMath xmlns:m="http://schemas.openxmlformats.org/officeDocument/2006/math">
+                    <m:sSub>
+                      <m:sSubPr>
+                        <m:ctrlPr>
+                          <a:rPr lang="fi-FI" i="1" smtClean="0">
+                            <a:effectLst/>
+                            <a:latin typeface="Cambria Math" panose="02040503050406030204" pitchFamily="18" charset="0"/>
+                            <a:ea typeface="Yu Mincho" panose="02020400000000000000" pitchFamily="18" charset="-128"/>
+                          </a:rPr>
+                        </m:ctrlPr>
+                      </m:sSubPr>
+                      <m:e>
+                        <m:r>
+                          <a:rPr lang="en-GB" sz="2800" i="1">
+                            <a:effectLst/>
+                            <a:latin typeface="Cambria Math" panose="02040503050406030204" pitchFamily="18" charset="0"/>
+                            <a:ea typeface="Yu Mincho" panose="02020400000000000000" pitchFamily="18" charset="-128"/>
+                            <a:cs typeface="Arial" panose="020B0604020202020204" pitchFamily="34" charset="0"/>
+                          </a:rPr>
+                          <m:t>𝐶</m:t>
+                        </m:r>
+                      </m:e>
+                      <m:sub>
+                        <m:r>
+                          <a:rPr lang="en-GB" sz="2800" i="1">
+                            <a:effectLst/>
+                            <a:latin typeface="Cambria Math" panose="02040503050406030204" pitchFamily="18" charset="0"/>
+                            <a:ea typeface="Yu Mincho" panose="02020400000000000000" pitchFamily="18" charset="-128"/>
+                            <a:cs typeface="Arial" panose="020B0604020202020204" pitchFamily="34" charset="0"/>
+                          </a:rPr>
+                          <m:t>𝑖</m:t>
+                        </m:r>
+                      </m:sub>
+                    </m:sSub>
+                    <m:r>
+                      <a:rPr lang="en-GB" sz="2800" i="1">
+                        <a:effectLst/>
+                        <a:latin typeface="Cambria Math" panose="02040503050406030204" pitchFamily="18" charset="0"/>
+                        <a:ea typeface="Yu Mincho" panose="02020400000000000000" pitchFamily="18" charset="-128"/>
+                        <a:cs typeface="Arial" panose="020B0604020202020204" pitchFamily="34" charset="0"/>
+                      </a:rPr>
+                      <m:t>=</m:t>
+                    </m:r>
+                    <m:sSub>
+                      <m:sSubPr>
+                        <m:ctrlPr>
+                          <a:rPr lang="fi-FI" i="1">
+                            <a:effectLst/>
+                            <a:latin typeface="Cambria Math" panose="02040503050406030204" pitchFamily="18" charset="0"/>
+                            <a:ea typeface="Yu Mincho" panose="02020400000000000000" pitchFamily="18" charset="-128"/>
+                          </a:rPr>
+                        </m:ctrlPr>
+                      </m:sSubPr>
+                      <m:e>
+                        <m:r>
+                          <a:rPr lang="en-GB" sz="2800" i="1">
+                            <a:effectLst/>
+                            <a:latin typeface="Cambria Math" panose="02040503050406030204" pitchFamily="18" charset="0"/>
+                            <a:ea typeface="Yu Mincho" panose="02020400000000000000" pitchFamily="18" charset="-128"/>
+                            <a:cs typeface="Arial" panose="020B0604020202020204" pitchFamily="34" charset="0"/>
+                          </a:rPr>
+                          <m:t>𝑃</m:t>
+                        </m:r>
+                      </m:e>
+                      <m:sub>
+                        <m:r>
+                          <a:rPr lang="en-GB" sz="2800" i="1">
+                            <a:effectLst/>
+                            <a:latin typeface="Cambria Math" panose="02040503050406030204" pitchFamily="18" charset="0"/>
+                            <a:ea typeface="Yu Mincho" panose="02020400000000000000" pitchFamily="18" charset="-128"/>
+                            <a:cs typeface="Arial" panose="020B0604020202020204" pitchFamily="34" charset="0"/>
+                          </a:rPr>
+                          <m:t>𝑖</m:t>
+                        </m:r>
+                      </m:sub>
+                    </m:sSub>
+                    <m:r>
+                      <a:rPr lang="en-GB" sz="2800" i="1">
+                        <a:effectLst/>
+                        <a:latin typeface="Cambria Math" panose="02040503050406030204" pitchFamily="18" charset="0"/>
+                        <a:ea typeface="Yu Mincho" panose="02020400000000000000" pitchFamily="18" charset="-128"/>
+                        <a:cs typeface="Arial" panose="020B0604020202020204" pitchFamily="34" charset="0"/>
+                      </a:rPr>
+                      <m:t>⊕ </m:t>
+                    </m:r>
+                    <m:sSub>
+                      <m:sSubPr>
+                        <m:ctrlPr>
+                          <a:rPr lang="fi-FI" i="1">
+                            <a:effectLst/>
+                            <a:latin typeface="Cambria Math" panose="02040503050406030204" pitchFamily="18" charset="0"/>
+                            <a:ea typeface="Yu Mincho" panose="02020400000000000000" pitchFamily="18" charset="-128"/>
+                          </a:rPr>
+                        </m:ctrlPr>
+                      </m:sSubPr>
+                      <m:e>
+                        <m:r>
+                          <a:rPr lang="en-GB" sz="2800" i="1">
+                            <a:effectLst/>
+                            <a:latin typeface="Cambria Math" panose="02040503050406030204" pitchFamily="18" charset="0"/>
+                            <a:ea typeface="Yu Mincho" panose="02020400000000000000" pitchFamily="18" charset="-128"/>
+                            <a:cs typeface="Arial" panose="020B0604020202020204" pitchFamily="34" charset="0"/>
+                          </a:rPr>
+                          <m:t>𝑂</m:t>
+                        </m:r>
+                      </m:e>
+                      <m:sub>
+                        <m:r>
+                          <a:rPr lang="en-GB" sz="2800" i="1">
+                            <a:effectLst/>
+                            <a:latin typeface="Cambria Math" panose="02040503050406030204" pitchFamily="18" charset="0"/>
+                            <a:ea typeface="Yu Mincho" panose="02020400000000000000" pitchFamily="18" charset="-128"/>
+                            <a:cs typeface="Arial" panose="020B0604020202020204" pitchFamily="34" charset="0"/>
+                          </a:rPr>
+                          <m:t>𝑖</m:t>
+                        </m:r>
+                      </m:sub>
+                    </m:sSub>
+                  </m:oMath>
+                </a14:m>
+                <a:r>
+                  <a:rPr lang="en-GB" sz="2800" dirty="0">
+                    <a:effectLst/>
+                    <a:latin typeface="Calibri" panose="020F0502020204030204" pitchFamily="34" charset="0"/>
+                    <a:ea typeface="Yu Mincho" panose="02020400000000000000" pitchFamily="18" charset="-128"/>
+                    <a:cs typeface="Arial" panose="020B0604020202020204" pitchFamily="34" charset="0"/>
+                  </a:rPr>
+                  <a:t>, </a:t>
+                </a:r>
+                <a:r>
+                  <a:rPr lang="en-GB" dirty="0" err="1">
+                    <a:latin typeface="Calibri" panose="020F0502020204030204" pitchFamily="34" charset="0"/>
+                    <a:ea typeface="Yu Mincho" panose="02020400000000000000" pitchFamily="18" charset="-128"/>
+                    <a:cs typeface="Arial" panose="020B0604020202020204" pitchFamily="34" charset="0"/>
+                  </a:rPr>
+                  <a:t>kun</a:t>
+                </a:r>
+                <a:r>
+                  <a:rPr lang="en-GB" sz="2800" dirty="0">
+                    <a:effectLst/>
+                    <a:latin typeface="Calibri" panose="020F0502020204030204" pitchFamily="34" charset="0"/>
+                    <a:ea typeface="Yu Mincho" panose="02020400000000000000" pitchFamily="18" charset="-128"/>
+                    <a:cs typeface="Arial" panose="020B0604020202020204" pitchFamily="34" charset="0"/>
+                  </a:rPr>
+                  <a:t> </a:t>
+                </a:r>
+                <a14:m>
+                  <m:oMath xmlns:m="http://schemas.openxmlformats.org/officeDocument/2006/math">
+                    <m:r>
+                      <a:rPr lang="en-GB" sz="2800" i="1">
+                        <a:effectLst/>
+                        <a:latin typeface="Cambria Math" panose="02040503050406030204" pitchFamily="18" charset="0"/>
+                        <a:ea typeface="Yu Mincho" panose="02020400000000000000" pitchFamily="18" charset="-128"/>
+                        <a:cs typeface="Arial" panose="020B0604020202020204" pitchFamily="34" charset="0"/>
+                      </a:rPr>
+                      <m:t>𝑖</m:t>
+                    </m:r>
+                    <m:r>
+                      <a:rPr lang="en-GB" sz="2800" i="1">
+                        <a:effectLst/>
+                        <a:latin typeface="Cambria Math" panose="02040503050406030204" pitchFamily="18" charset="0"/>
+                        <a:ea typeface="Yu Mincho" panose="02020400000000000000" pitchFamily="18" charset="-128"/>
+                        <a:cs typeface="Arial" panose="020B0604020202020204" pitchFamily="34" charset="0"/>
+                      </a:rPr>
+                      <m:t>&lt;</m:t>
+                    </m:r>
+                    <m:r>
+                      <a:rPr lang="en-GB" sz="2800" i="1">
+                        <a:effectLst/>
+                        <a:latin typeface="Cambria Math" panose="02040503050406030204" pitchFamily="18" charset="0"/>
+                        <a:ea typeface="Yu Mincho" panose="02020400000000000000" pitchFamily="18" charset="-128"/>
+                        <a:cs typeface="Arial" panose="020B0604020202020204" pitchFamily="34" charset="0"/>
+                      </a:rPr>
+                      <m:t>𝑛</m:t>
+                    </m:r>
+                  </m:oMath>
+                </a14:m>
+                <a:r>
+                  <a:rPr lang="en-GB" sz="2800" dirty="0">
+                    <a:effectLst/>
+                    <a:latin typeface="Calibri" panose="020F0502020204030204" pitchFamily="34" charset="0"/>
+                    <a:ea typeface="Yu Mincho" panose="02020400000000000000" pitchFamily="18" charset="-128"/>
+                    <a:cs typeface="Arial" panose="020B0604020202020204" pitchFamily="34" charset="0"/>
+                  </a:rPr>
+                  <a:t> and </a:t>
+                </a:r>
+                <a14:m>
+                  <m:oMath xmlns:m="http://schemas.openxmlformats.org/officeDocument/2006/math">
+                    <m:sSub>
+                      <m:sSubPr>
+                        <m:ctrlPr>
+                          <a:rPr lang="fi-FI" i="1">
+                            <a:effectLst/>
+                            <a:latin typeface="Cambria Math" panose="02040503050406030204" pitchFamily="18" charset="0"/>
+                            <a:ea typeface="Yu Mincho" panose="02020400000000000000" pitchFamily="18" charset="-128"/>
+                          </a:rPr>
+                        </m:ctrlPr>
+                      </m:sSubPr>
+                      <m:e>
+                        <m:r>
+                          <a:rPr lang="en-GB" sz="2800" i="1">
+                            <a:effectLst/>
+                            <a:latin typeface="Cambria Math" panose="02040503050406030204" pitchFamily="18" charset="0"/>
+                            <a:ea typeface="Yu Mincho" panose="02020400000000000000" pitchFamily="18" charset="-128"/>
+                            <a:cs typeface="Arial" panose="020B0604020202020204" pitchFamily="34" charset="0"/>
+                          </a:rPr>
+                          <m:t>𝐶</m:t>
+                        </m:r>
+                      </m:e>
+                      <m:sub>
+                        <m:r>
+                          <a:rPr lang="en-GB" sz="2800" i="1">
+                            <a:effectLst/>
+                            <a:latin typeface="Cambria Math" panose="02040503050406030204" pitchFamily="18" charset="0"/>
+                            <a:ea typeface="Yu Mincho" panose="02020400000000000000" pitchFamily="18" charset="-128"/>
+                            <a:cs typeface="Arial" panose="020B0604020202020204" pitchFamily="34" charset="0"/>
+                          </a:rPr>
+                          <m:t>𝑛</m:t>
+                        </m:r>
+                      </m:sub>
+                    </m:sSub>
+                    <m:r>
+                      <a:rPr lang="en-GB" sz="2800" i="1">
+                        <a:effectLst/>
+                        <a:latin typeface="Cambria Math" panose="02040503050406030204" pitchFamily="18" charset="0"/>
+                        <a:ea typeface="Yu Mincho" panose="02020400000000000000" pitchFamily="18" charset="-128"/>
+                        <a:cs typeface="Arial" panose="020B0604020202020204" pitchFamily="34" charset="0"/>
+                      </a:rPr>
+                      <m:t>=</m:t>
+                    </m:r>
+                    <m:sSub>
+                      <m:sSubPr>
+                        <m:ctrlPr>
+                          <a:rPr lang="fi-FI" i="1">
+                            <a:effectLst/>
+                            <a:latin typeface="Cambria Math" panose="02040503050406030204" pitchFamily="18" charset="0"/>
+                            <a:ea typeface="Yu Mincho" panose="02020400000000000000" pitchFamily="18" charset="-128"/>
+                          </a:rPr>
+                        </m:ctrlPr>
+                      </m:sSubPr>
+                      <m:e>
+                        <m:r>
+                          <a:rPr lang="en-GB" sz="2800" i="1">
+                            <a:effectLst/>
+                            <a:latin typeface="Cambria Math" panose="02040503050406030204" pitchFamily="18" charset="0"/>
+                            <a:ea typeface="Yu Mincho" panose="02020400000000000000" pitchFamily="18" charset="-128"/>
+                            <a:cs typeface="Arial" panose="020B0604020202020204" pitchFamily="34" charset="0"/>
+                          </a:rPr>
+                          <m:t>𝑃</m:t>
+                        </m:r>
+                      </m:e>
+                      <m:sub>
+                        <m:r>
+                          <a:rPr lang="en-GB" sz="2800" i="1">
+                            <a:effectLst/>
+                            <a:latin typeface="Cambria Math" panose="02040503050406030204" pitchFamily="18" charset="0"/>
+                            <a:ea typeface="Yu Mincho" panose="02020400000000000000" pitchFamily="18" charset="-128"/>
+                            <a:cs typeface="Arial" panose="020B0604020202020204" pitchFamily="34" charset="0"/>
+                          </a:rPr>
+                          <m:t>𝑛</m:t>
+                        </m:r>
+                      </m:sub>
+                    </m:sSub>
+                    <m:r>
+                      <a:rPr lang="en-GB" sz="2800" i="1">
+                        <a:effectLst/>
+                        <a:latin typeface="Cambria Math" panose="02040503050406030204" pitchFamily="18" charset="0"/>
+                        <a:ea typeface="Yu Mincho" panose="02020400000000000000" pitchFamily="18" charset="-128"/>
+                        <a:cs typeface="Arial" panose="020B0604020202020204" pitchFamily="34" charset="0"/>
+                      </a:rPr>
+                      <m:t>⊕</m:t>
+                    </m:r>
+                    <m:r>
+                      <a:rPr lang="en-GB" sz="2800" i="1">
+                        <a:effectLst/>
+                        <a:latin typeface="Cambria Math" panose="02040503050406030204" pitchFamily="18" charset="0"/>
+                        <a:ea typeface="Yu Mincho" panose="02020400000000000000" pitchFamily="18" charset="-128"/>
+                        <a:cs typeface="Arial" panose="020B0604020202020204" pitchFamily="34" charset="0"/>
+                      </a:rPr>
+                      <m:t>𝑀𝑆</m:t>
+                    </m:r>
+                    <m:sSub>
+                      <m:sSubPr>
+                        <m:ctrlPr>
+                          <a:rPr lang="fi-FI" i="1">
+                            <a:effectLst/>
+                            <a:latin typeface="Cambria Math" panose="02040503050406030204" pitchFamily="18" charset="0"/>
+                            <a:ea typeface="Yu Mincho" panose="02020400000000000000" pitchFamily="18" charset="-128"/>
+                          </a:rPr>
+                        </m:ctrlPr>
+                      </m:sSubPr>
+                      <m:e>
+                        <m:r>
+                          <a:rPr lang="en-GB" sz="2800" i="1">
+                            <a:effectLst/>
+                            <a:latin typeface="Cambria Math" panose="02040503050406030204" pitchFamily="18" charset="0"/>
+                            <a:ea typeface="Yu Mincho" panose="02020400000000000000" pitchFamily="18" charset="-128"/>
+                            <a:cs typeface="Arial" panose="020B0604020202020204" pitchFamily="34" charset="0"/>
+                          </a:rPr>
+                          <m:t>𝐵</m:t>
+                        </m:r>
+                      </m:e>
+                      <m:sub>
+                        <m:r>
+                          <a:rPr lang="en-GB" sz="2800" i="1">
+                            <a:effectLst/>
+                            <a:latin typeface="Cambria Math" panose="02040503050406030204" pitchFamily="18" charset="0"/>
+                            <a:ea typeface="Yu Mincho" panose="02020400000000000000" pitchFamily="18" charset="-128"/>
+                            <a:cs typeface="Arial" panose="020B0604020202020204" pitchFamily="34" charset="0"/>
+                          </a:rPr>
+                          <m:t>𝑙</m:t>
+                        </m:r>
+                      </m:sub>
+                    </m:sSub>
+                    <m:r>
+                      <a:rPr lang="en-GB" sz="2800" i="1">
+                        <a:effectLst/>
+                        <a:latin typeface="Cambria Math" panose="02040503050406030204" pitchFamily="18" charset="0"/>
+                        <a:ea typeface="Yu Mincho" panose="02020400000000000000" pitchFamily="18" charset="-128"/>
+                        <a:cs typeface="Arial" panose="020B0604020202020204" pitchFamily="34" charset="0"/>
+                      </a:rPr>
+                      <m:t>(</m:t>
+                    </m:r>
+                    <m:sSub>
+                      <m:sSubPr>
+                        <m:ctrlPr>
+                          <a:rPr lang="fi-FI" i="1">
+                            <a:effectLst/>
+                            <a:latin typeface="Cambria Math" panose="02040503050406030204" pitchFamily="18" charset="0"/>
+                            <a:ea typeface="Yu Mincho" panose="02020400000000000000" pitchFamily="18" charset="-128"/>
+                          </a:rPr>
+                        </m:ctrlPr>
+                      </m:sSubPr>
+                      <m:e>
+                        <m:r>
+                          <a:rPr lang="en-GB" sz="2800" i="1">
+                            <a:effectLst/>
+                            <a:latin typeface="Cambria Math" panose="02040503050406030204" pitchFamily="18" charset="0"/>
+                            <a:ea typeface="Yu Mincho" panose="02020400000000000000" pitchFamily="18" charset="-128"/>
+                            <a:cs typeface="Arial" panose="020B0604020202020204" pitchFamily="34" charset="0"/>
+                          </a:rPr>
+                          <m:t>𝑂</m:t>
+                        </m:r>
+                      </m:e>
+                      <m:sub>
+                        <m:r>
+                          <a:rPr lang="en-GB" sz="2800" i="1">
+                            <a:effectLst/>
+                            <a:latin typeface="Cambria Math" panose="02040503050406030204" pitchFamily="18" charset="0"/>
+                            <a:ea typeface="Yu Mincho" panose="02020400000000000000" pitchFamily="18" charset="-128"/>
+                            <a:cs typeface="Arial" panose="020B0604020202020204" pitchFamily="34" charset="0"/>
+                          </a:rPr>
+                          <m:t>𝑛</m:t>
+                        </m:r>
+                      </m:sub>
+                    </m:sSub>
+                    <m:r>
+                      <a:rPr lang="en-GB" sz="2800" i="1">
+                        <a:effectLst/>
+                        <a:latin typeface="Cambria Math" panose="02040503050406030204" pitchFamily="18" charset="0"/>
+                        <a:ea typeface="Yu Mincho" panose="02020400000000000000" pitchFamily="18" charset="-128"/>
+                        <a:cs typeface="Arial" panose="020B0604020202020204" pitchFamily="34" charset="0"/>
+                      </a:rPr>
+                      <m:t>)</m:t>
+                    </m:r>
+                  </m:oMath>
+                </a14:m>
+                <a:endParaRPr lang="fi-FI" dirty="0"/>
+              </a:p>
+              <a:p>
+                <a:r>
+                  <a:rPr lang="fi-FI" dirty="0"/>
+                  <a:t>Tarvitaan ainoastaan lohkosalaimen salaussuunta. XOR-operaation ominaisuuden ansiosta purku tapahtuu käyttämällä samaa avainketjua mutta vaihtamalla selvälohkon ja salalohkon paikkaa. Esim. </a:t>
+                </a:r>
+                <a14:m>
+                  <m:oMath xmlns:m="http://schemas.openxmlformats.org/officeDocument/2006/math">
+                    <m:sSub>
+                      <m:sSubPr>
+                        <m:ctrlPr>
+                          <a:rPr lang="fi-FI" b="0" i="1" smtClean="0">
+                            <a:latin typeface="Cambria Math" panose="02040503050406030204" pitchFamily="18" charset="0"/>
+                          </a:rPr>
+                        </m:ctrlPr>
+                      </m:sSubPr>
+                      <m:e>
+                        <m:r>
+                          <a:rPr lang="fi-FI" b="0" i="1" smtClean="0">
+                            <a:latin typeface="Cambria Math" panose="02040503050406030204" pitchFamily="18" charset="0"/>
+                          </a:rPr>
+                          <m:t>𝐶</m:t>
+                        </m:r>
+                      </m:e>
+                      <m:sub>
+                        <m:r>
+                          <a:rPr lang="fi-FI" b="0" i="1" smtClean="0">
+                            <a:latin typeface="Cambria Math" panose="02040503050406030204" pitchFamily="18" charset="0"/>
+                          </a:rPr>
+                          <m:t>1</m:t>
+                        </m:r>
+                      </m:sub>
+                    </m:sSub>
+                    <m:r>
+                      <a:rPr lang="fi-FI" b="0" i="1" smtClean="0">
+                        <a:latin typeface="Cambria Math" panose="02040503050406030204" pitchFamily="18" charset="0"/>
+                      </a:rPr>
+                      <m:t>=</m:t>
+                    </m:r>
+                    <m:sSub>
+                      <m:sSubPr>
+                        <m:ctrlPr>
+                          <a:rPr lang="fi-FI" b="0" i="1" smtClean="0">
+                            <a:latin typeface="Cambria Math" panose="02040503050406030204" pitchFamily="18" charset="0"/>
+                          </a:rPr>
+                        </m:ctrlPr>
+                      </m:sSubPr>
+                      <m:e>
+                        <m:r>
+                          <a:rPr lang="fi-FI" b="0" i="1" smtClean="0">
+                            <a:latin typeface="Cambria Math" panose="02040503050406030204" pitchFamily="18" charset="0"/>
+                          </a:rPr>
+                          <m:t>𝑂</m:t>
+                        </m:r>
+                      </m:e>
+                      <m:sub>
+                        <m:r>
+                          <a:rPr lang="fi-FI" b="0" i="1" smtClean="0">
+                            <a:latin typeface="Cambria Math" panose="02040503050406030204" pitchFamily="18" charset="0"/>
+                          </a:rPr>
+                          <m:t>1</m:t>
+                        </m:r>
+                      </m:sub>
+                    </m:sSub>
+                    <m:r>
+                      <a:rPr lang="fi-FI" b="0" i="1" smtClean="0">
+                        <a:latin typeface="Cambria Math" panose="02040503050406030204" pitchFamily="18" charset="0"/>
+                        <a:ea typeface="Cambria Math" panose="02040503050406030204" pitchFamily="18" charset="0"/>
+                      </a:rPr>
+                      <m:t>⊕</m:t>
+                    </m:r>
+                    <m:sSub>
+                      <m:sSubPr>
+                        <m:ctrlPr>
+                          <a:rPr lang="fi-FI" b="0" i="1" smtClean="0">
+                            <a:latin typeface="Cambria Math" panose="02040503050406030204" pitchFamily="18" charset="0"/>
+                            <a:ea typeface="Cambria Math" panose="02040503050406030204" pitchFamily="18" charset="0"/>
+                          </a:rPr>
+                        </m:ctrlPr>
+                      </m:sSubPr>
+                      <m:e>
+                        <m:r>
+                          <a:rPr lang="fi-FI" b="0" i="1" smtClean="0">
+                            <a:latin typeface="Cambria Math" panose="02040503050406030204" pitchFamily="18" charset="0"/>
+                            <a:ea typeface="Cambria Math" panose="02040503050406030204" pitchFamily="18" charset="0"/>
+                          </a:rPr>
+                          <m:t>𝑃</m:t>
+                        </m:r>
+                      </m:e>
+                      <m:sub>
+                        <m:r>
+                          <a:rPr lang="fi-FI" b="0" i="1" smtClean="0">
+                            <a:latin typeface="Cambria Math" panose="02040503050406030204" pitchFamily="18" charset="0"/>
+                            <a:ea typeface="Cambria Math" panose="02040503050406030204" pitchFamily="18" charset="0"/>
+                          </a:rPr>
+                          <m:t>1</m:t>
+                        </m:r>
+                      </m:sub>
+                    </m:sSub>
+                    <m:r>
+                      <a:rPr lang="fi-FI" i="1">
+                        <a:latin typeface="Cambria Math" panose="02040503050406030204" pitchFamily="18" charset="0"/>
+                        <a:ea typeface="Cambria Math" panose="02040503050406030204" pitchFamily="18" charset="0"/>
+                      </a:rPr>
+                      <m:t>⇔</m:t>
+                    </m:r>
+                    <m:sSub>
+                      <m:sSubPr>
+                        <m:ctrlPr>
+                          <a:rPr lang="fi-FI" b="0" i="1" smtClean="0">
+                            <a:latin typeface="Cambria Math" panose="02040503050406030204" pitchFamily="18" charset="0"/>
+                            <a:ea typeface="Cambria Math" panose="02040503050406030204" pitchFamily="18" charset="0"/>
+                          </a:rPr>
+                        </m:ctrlPr>
+                      </m:sSubPr>
+                      <m:e>
+                        <m:r>
+                          <a:rPr lang="fi-FI" b="0" i="1" smtClean="0">
+                            <a:latin typeface="Cambria Math" panose="02040503050406030204" pitchFamily="18" charset="0"/>
+                            <a:ea typeface="Cambria Math" panose="02040503050406030204" pitchFamily="18" charset="0"/>
+                          </a:rPr>
+                          <m:t>𝑃</m:t>
+                        </m:r>
+                      </m:e>
+                      <m:sub>
+                        <m:r>
+                          <a:rPr lang="fi-FI" b="0" i="1" smtClean="0">
+                            <a:latin typeface="Cambria Math" panose="02040503050406030204" pitchFamily="18" charset="0"/>
+                            <a:ea typeface="Cambria Math" panose="02040503050406030204" pitchFamily="18" charset="0"/>
+                          </a:rPr>
+                          <m:t>1</m:t>
+                        </m:r>
+                      </m:sub>
+                    </m:sSub>
+                    <m:r>
+                      <a:rPr lang="fi-FI" b="0" i="1" smtClean="0">
+                        <a:latin typeface="Cambria Math" panose="02040503050406030204" pitchFamily="18" charset="0"/>
+                        <a:ea typeface="Cambria Math" panose="02040503050406030204" pitchFamily="18" charset="0"/>
+                      </a:rPr>
+                      <m:t>=</m:t>
+                    </m:r>
+                    <m:sSub>
+                      <m:sSubPr>
+                        <m:ctrlPr>
+                          <a:rPr lang="fi-FI" b="0" i="1" smtClean="0">
+                            <a:latin typeface="Cambria Math" panose="02040503050406030204" pitchFamily="18" charset="0"/>
+                            <a:ea typeface="Cambria Math" panose="02040503050406030204" pitchFamily="18" charset="0"/>
+                          </a:rPr>
+                        </m:ctrlPr>
+                      </m:sSubPr>
+                      <m:e>
+                        <m:r>
+                          <a:rPr lang="fi-FI" b="0" i="1" smtClean="0">
+                            <a:latin typeface="Cambria Math" panose="02040503050406030204" pitchFamily="18" charset="0"/>
+                            <a:ea typeface="Cambria Math" panose="02040503050406030204" pitchFamily="18" charset="0"/>
+                          </a:rPr>
+                          <m:t>𝑂</m:t>
+                        </m:r>
+                      </m:e>
+                      <m:sub>
+                        <m:r>
+                          <a:rPr lang="fi-FI" b="0" i="1" smtClean="0">
+                            <a:latin typeface="Cambria Math" panose="02040503050406030204" pitchFamily="18" charset="0"/>
+                            <a:ea typeface="Cambria Math" panose="02040503050406030204" pitchFamily="18" charset="0"/>
+                          </a:rPr>
+                          <m:t>1</m:t>
+                        </m:r>
+                      </m:sub>
+                    </m:sSub>
+                    <m:r>
+                      <a:rPr lang="fi-FI" b="0" i="1" smtClean="0">
+                        <a:latin typeface="Cambria Math" panose="02040503050406030204" pitchFamily="18" charset="0"/>
+                        <a:ea typeface="Cambria Math" panose="02040503050406030204" pitchFamily="18" charset="0"/>
+                      </a:rPr>
+                      <m:t>⊕</m:t>
+                    </m:r>
+                    <m:sSub>
+                      <m:sSubPr>
+                        <m:ctrlPr>
+                          <a:rPr lang="fi-FI" b="0" i="1" smtClean="0">
+                            <a:latin typeface="Cambria Math" panose="02040503050406030204" pitchFamily="18" charset="0"/>
+                            <a:ea typeface="Cambria Math" panose="02040503050406030204" pitchFamily="18" charset="0"/>
+                          </a:rPr>
+                        </m:ctrlPr>
+                      </m:sSubPr>
+                      <m:e>
+                        <m:r>
+                          <a:rPr lang="fi-FI" b="0" i="1" smtClean="0">
+                            <a:latin typeface="Cambria Math" panose="02040503050406030204" pitchFamily="18" charset="0"/>
+                            <a:ea typeface="Cambria Math" panose="02040503050406030204" pitchFamily="18" charset="0"/>
+                          </a:rPr>
+                          <m:t>𝐶</m:t>
+                        </m:r>
+                      </m:e>
+                      <m:sub>
+                        <m:r>
+                          <a:rPr lang="fi-FI" b="0" i="1" smtClean="0">
+                            <a:latin typeface="Cambria Math" panose="02040503050406030204" pitchFamily="18" charset="0"/>
+                            <a:ea typeface="Cambria Math" panose="02040503050406030204" pitchFamily="18" charset="0"/>
+                          </a:rPr>
+                          <m:t>1</m:t>
+                        </m:r>
+                      </m:sub>
+                    </m:sSub>
+                  </m:oMath>
+                </a14:m>
+                <a:endParaRPr lang="fi-FI" dirty="0"/>
+              </a:p>
+            </p:txBody>
+          </p:sp>
+        </mc:Choice>
+        <mc:Fallback xmlns="">
+          <p:sp>
+            <p:nvSpPr>
+              <p:cNvPr id="3" name="Content Placeholder 2">
+                <a:extLst>
+                  <a:ext uri="{FF2B5EF4-FFF2-40B4-BE49-F238E27FC236}">
+                    <a16:creationId xmlns:a16="http://schemas.microsoft.com/office/drawing/2014/main" id="{5230BB5D-30F4-C465-4557-AB23115D420B}"/>
+                  </a:ext>
+                </a:extLst>
+              </p:cNvPr>
+              <p:cNvSpPr>
+                <a:spLocks noGrp="1" noRot="1" noChangeAspect="1" noMove="1" noResize="1" noEditPoints="1" noAdjustHandles="1" noChangeArrowheads="1" noChangeShapeType="1" noTextEdit="1"/>
+              </p:cNvSpPr>
+              <p:nvPr>
+                <p:ph sz="half" idx="1"/>
+              </p:nvPr>
+            </p:nvSpPr>
+            <p:spPr>
+              <a:xfrm>
+                <a:off x="6096000" y="1690688"/>
+                <a:ext cx="5181600" cy="4351338"/>
+              </a:xfrm>
+              <a:blipFill>
+                <a:blip r:embed="rId2"/>
+                <a:stretch>
+                  <a:fillRect l="-353" t="-1541" r="-1059"/>
+                </a:stretch>
+              </a:blipFill>
+            </p:spPr>
+            <p:txBody>
+              <a:bodyPr/>
+              <a:lstStyle/>
+              <a:p>
+                <a:r>
+                  <a:rPr lang="fi-FI">
+                    <a:noFill/>
+                  </a:rPr>
+                  <a:t> </a:t>
+                </a:r>
+              </a:p>
+            </p:txBody>
+          </p:sp>
+        </mc:Fallback>
+      </mc:AlternateContent>
       <p:pic>
         <p:nvPicPr>
           <p:cNvPr id="6" name="Content Placeholder 5">
@@ -5555,13 +7330,13 @@
           </p:nvPr>
         </p:nvPicPr>
         <p:blipFill>
-          <a:blip r:embed="rId2">
+          <a:blip r:embed="rId3">
             <a:extLst>
               <a:ext uri="{28A0092B-C50C-407E-A947-70E740481C1C}">
                 <a14:useLocalDpi xmlns:a14="http://schemas.microsoft.com/office/drawing/2010/main" val="0"/>
               </a:ext>
               <a:ext uri="{96DAC541-7B7A-43D3-8B79-37D633B846F1}">
-                <asvg:svgBlip xmlns:asvg="http://schemas.microsoft.com/office/drawing/2016/SVG/main" r:embed="rId3"/>
+                <asvg:svgBlip xmlns:asvg="http://schemas.microsoft.com/office/drawing/2016/SVG/main" r:embed="rId4"/>
               </a:ext>
             </a:extLst>
           </a:blip>
@@ -5590,13 +7365,13 @@
           <p:nvPr/>
         </p:nvPicPr>
         <p:blipFill>
-          <a:blip r:embed="rId4">
+          <a:blip r:embed="rId5">
             <a:extLst>
               <a:ext uri="{28A0092B-C50C-407E-A947-70E740481C1C}">
                 <a14:useLocalDpi xmlns:a14="http://schemas.microsoft.com/office/drawing/2010/main" val="0"/>
               </a:ext>
               <a:ext uri="{96DAC541-7B7A-43D3-8B79-37D633B846F1}">
-                <asvg:svgBlip xmlns:asvg="http://schemas.microsoft.com/office/drawing/2016/SVG/main" r:embed="rId5"/>
+                <asvg:svgBlip xmlns:asvg="http://schemas.microsoft.com/office/drawing/2016/SVG/main" r:embed="rId6"/>
               </a:ext>
             </a:extLst>
           </a:blip>
@@ -5692,8 +7467,8 @@
           </a:p>
         </p:txBody>
       </p:sp>
-      <mc:AlternateContent xmlns:mc="http://schemas.openxmlformats.org/markup-compatibility/2006">
-        <mc:Choice xmlns:a14="http://schemas.microsoft.com/office/drawing/2010/main" Requires="a14">
+      <mc:AlternateContent xmlns:mc="http://schemas.openxmlformats.org/markup-compatibility/2006" xmlns:a14="http://schemas.microsoft.com/office/drawing/2010/main">
+        <mc:Choice Requires="a14">
           <p:sp>
             <p:nvSpPr>
               <p:cNvPr id="3" name="Content Placeholder 2">
@@ -5718,7 +7493,7 @@
             </p:spPr>
             <p:txBody>
               <a:bodyPr>
-                <a:normAutofit fontScale="62500" lnSpcReduction="20000"/>
+                <a:normAutofit fontScale="55000" lnSpcReduction="20000"/>
               </a:bodyPr>
               <a:lstStyle/>
               <a:p>
@@ -5954,12 +7729,60 @@
                   <a:rPr lang="fi-FI" dirty="0" err="1"/>
                   <a:t>lohkosalaimille</a:t>
                 </a:r>
-                <a:endParaRPr lang="fi-FI" dirty="0"/>
+                <a:r>
+                  <a:rPr lang="fi-FI" dirty="0"/>
+                  <a:t> </a:t>
+                </a:r>
+              </a:p>
+              <a:p>
+                <a:r>
+                  <a:rPr lang="fi-FI" dirty="0"/>
+                  <a:t>Suositus: </a:t>
+                </a:r>
+                <a:r>
+                  <a:rPr lang="fi-FI" dirty="0" err="1"/>
+                  <a:t>nonce</a:t>
+                </a:r>
+                <a:r>
+                  <a:rPr lang="fi-FI" dirty="0"/>
+                  <a:t> 96 bittiä, </a:t>
+                </a:r>
+                <a:r>
+                  <a:rPr lang="fi-FI" dirty="0" err="1"/>
+                  <a:t>counter</a:t>
+                </a:r>
+                <a:r>
+                  <a:rPr lang="fi-FI" dirty="0"/>
+                  <a:t> 32 bittiä </a:t>
+                </a:r>
+                <a14:m>
+                  <m:oMath xmlns:m="http://schemas.openxmlformats.org/officeDocument/2006/math">
+                    <m:r>
+                      <a:rPr lang="fi-FI" i="1" smtClean="0">
+                        <a:latin typeface="Cambria Math" panose="02040503050406030204" pitchFamily="18" charset="0"/>
+                        <a:ea typeface="Cambria Math" panose="02040503050406030204" pitchFamily="18" charset="0"/>
+                      </a:rPr>
+                      <m:t>⇒</m:t>
+                    </m:r>
+                  </m:oMath>
+                </a14:m>
+                <a:r>
+                  <a:rPr lang="fi-FI" dirty="0"/>
+                  <a:t> salattavan tiedoston maks. koko 64 </a:t>
+                </a:r>
+                <a:r>
+                  <a:rPr lang="fi-FI" dirty="0" err="1"/>
+                  <a:t>GiB</a:t>
+                </a:r>
+                <a:r>
+                  <a:rPr lang="fi-FI" dirty="0"/>
+                  <a:t> (n. 68,7 GB) </a:t>
+                </a:r>
               </a:p>
             </p:txBody>
           </p:sp>
         </mc:Choice>
-        <mc:Fallback>
+        <mc:Fallback xmlns="">
           <p:sp>
             <p:nvSpPr>
               <p:cNvPr id="3" name="Content Placeholder 2">
@@ -5984,7 +7807,7 @@
               <a:blipFill>
                 <a:blip r:embed="rId2"/>
                 <a:stretch>
-                  <a:fillRect l="-706" t="-2241" r="-941"/>
+                  <a:fillRect l="-353" t="-1541" r="-824"/>
                 </a:stretch>
               </a:blipFill>
             </p:spPr>
@@ -6036,8 +7859,8 @@
         </p:blipFill>
         <p:spPr>
           <a:xfrm>
-            <a:off x="838200" y="2419835"/>
-            <a:ext cx="5181600" cy="2893042"/>
+            <a:off x="138777" y="2029326"/>
+            <a:ext cx="5881023" cy="3283551"/>
           </a:xfrm>
         </p:spPr>
       </p:pic>

</xml_diff>